<commit_message>
Review & Restructuring V1
</commit_message>
<xml_diff>
--- a/courseMaterial/Objective-3-Primitives/Data Types [Autosaved].pptx
+++ b/courseMaterial/Objective-3-Primitives/Data Types [Autosaved].pptx
@@ -124,10 +124,10 @@
   </p:defaultTextStyle>
   <p:extLst>
     <p:ext uri="{EFAFB233-063F-42B5-8137-9DF3F51BA10A}">
-      <p15:sldGuideLst xmlns:p15="http://schemas.microsoft.com/office/powerpoint/2012/main"/>
+      <p15:sldGuideLst xmlns:p15="http://schemas.microsoft.com/office/powerpoint/2012/main" xmlns=""/>
     </p:ext>
     <p:ext uri="{2D200454-40CA-4A62-9FC3-DE9A4176ACB9}">
-      <p15:notesGuideLst xmlns:p15="http://schemas.microsoft.com/office/powerpoint/2012/main"/>
+      <p15:notesGuideLst xmlns:p15="http://schemas.microsoft.com/office/powerpoint/2012/main" xmlns=""/>
     </p:ext>
   </p:extLst>
 </p:presentation>
@@ -160,7 +160,7 @@
           <p:cNvPr id="2" name="Header Placeholder 1">
             <a:extLst>
               <a:ext uri="{FF2B5EF4-FFF2-40B4-BE49-F238E27FC236}">
-                <a16:creationId xmlns:a16="http://schemas.microsoft.com/office/drawing/2014/main" id="{2BC10188-DC2C-458D-AB41-143A0BE9A310}"/>
+                <a16:creationId xmlns:a16="http://schemas.microsoft.com/office/drawing/2014/main" xmlns="" id="{2BC10188-DC2C-458D-AB41-143A0BE9A310}"/>
               </a:ext>
             </a:extLst>
           </p:cNvPr>
@@ -197,7 +197,7 @@
           <p:cNvPr id="3" name="Date Placeholder 2">
             <a:extLst>
               <a:ext uri="{FF2B5EF4-FFF2-40B4-BE49-F238E27FC236}">
-                <a16:creationId xmlns:a16="http://schemas.microsoft.com/office/drawing/2014/main" id="{C9634E15-7196-43FC-B912-C4D8B4A2CE79}"/>
+                <a16:creationId xmlns:a16="http://schemas.microsoft.com/office/drawing/2014/main" xmlns="" id="{C9634E15-7196-43FC-B912-C4D8B4A2CE79}"/>
               </a:ext>
             </a:extLst>
           </p:cNvPr>
@@ -227,7 +227,8 @@
           <a:p>
             <a:fld id="{68416927-5E9C-4E77-85FE-EE4C81C1DE39}" type="datetimeFigureOut">
               <a:rPr lang="en-US" smtClean="0"/>
-              <a:t>3/9/2020</a:t>
+              <a:pPr/>
+              <a:t>4/19/2020</a:t>
             </a:fld>
             <a:endParaRPr lang="en-US" dirty="0"/>
           </a:p>
@@ -238,7 +239,7 @@
           <p:cNvPr id="4" name="Footer Placeholder 3">
             <a:extLst>
               <a:ext uri="{FF2B5EF4-FFF2-40B4-BE49-F238E27FC236}">
-                <a16:creationId xmlns:a16="http://schemas.microsoft.com/office/drawing/2014/main" id="{89EA2570-D5B6-41CB-96C2-FFC9944668E5}"/>
+                <a16:creationId xmlns:a16="http://schemas.microsoft.com/office/drawing/2014/main" xmlns="" id="{89EA2570-D5B6-41CB-96C2-FFC9944668E5}"/>
               </a:ext>
             </a:extLst>
           </p:cNvPr>
@@ -275,7 +276,7 @@
           <p:cNvPr id="5" name="Slide Number Placeholder 4">
             <a:extLst>
               <a:ext uri="{FF2B5EF4-FFF2-40B4-BE49-F238E27FC236}">
-                <a16:creationId xmlns:a16="http://schemas.microsoft.com/office/drawing/2014/main" id="{15C31B37-7A69-4C30-9B63-29F8242FC246}"/>
+                <a16:creationId xmlns:a16="http://schemas.microsoft.com/office/drawing/2014/main" xmlns="" id="{15C31B37-7A69-4C30-9B63-29F8242FC246}"/>
               </a:ext>
             </a:extLst>
           </p:cNvPr>
@@ -305,6 +306,7 @@
           <a:p>
             <a:fld id="{D389B6C8-888A-401B-9F9B-D41D36B6C3E9}" type="slidenum">
               <a:rPr lang="en-US" smtClean="0"/>
+              <a:pPr/>
               <a:t>‹#›</a:t>
             </a:fld>
             <a:endParaRPr lang="en-US" dirty="0"/>
@@ -314,7 +316,7 @@
     </p:spTree>
     <p:extLst>
       <p:ext uri="{BB962C8B-B14F-4D97-AF65-F5344CB8AC3E}">
-        <p14:creationId xmlns:p14="http://schemas.microsoft.com/office/powerpoint/2010/main" val="2413100067"/>
+        <p14:creationId xmlns:p14="http://schemas.microsoft.com/office/powerpoint/2010/main" xmlns="" val="2413100067"/>
       </p:ext>
     </p:extLst>
   </p:cSld>
@@ -404,7 +406,8 @@
           <a:p>
             <a:fld id="{FA798B7E-6604-4F74-86DB-B30627D56244}" type="datetimeFigureOut">
               <a:rPr lang="en-US" smtClean="0"/>
-              <a:t>3/9/2020</a:t>
+              <a:pPr/>
+              <a:t>4/19/2020</a:t>
             </a:fld>
             <a:endParaRPr lang="en-US" dirty="0"/>
           </a:p>
@@ -562,6 +565,7 @@
           <a:p>
             <a:fld id="{D3F28A1F-3E69-47E5-AE93-E7F2155A242D}" type="slidenum">
               <a:rPr lang="en-US" smtClean="0"/>
+              <a:pPr/>
               <a:t>‹#›</a:t>
             </a:fld>
             <a:endParaRPr lang="en-US" dirty="0"/>
@@ -571,7 +575,7 @@
     </p:spTree>
     <p:extLst>
       <p:ext uri="{BB962C8B-B14F-4D97-AF65-F5344CB8AC3E}">
-        <p14:creationId xmlns:p14="http://schemas.microsoft.com/office/powerpoint/2010/main" val="2075933273"/>
+        <p14:creationId xmlns:p14="http://schemas.microsoft.com/office/powerpoint/2010/main" xmlns="" val="2075933273"/>
       </p:ext>
     </p:extLst>
   </p:cSld>
@@ -693,7 +697,7 @@
           <p:cNvPr id="2" name="Title 1">
             <a:extLst>
               <a:ext uri="{FF2B5EF4-FFF2-40B4-BE49-F238E27FC236}">
-                <a16:creationId xmlns:a16="http://schemas.microsoft.com/office/drawing/2014/main" id="{E5798B13-3B32-4354-B2B5-3165F2F6E65F}"/>
+                <a16:creationId xmlns:a16="http://schemas.microsoft.com/office/drawing/2014/main" xmlns="" id="{E5798B13-3B32-4354-B2B5-3165F2F6E65F}"/>
               </a:ext>
             </a:extLst>
           </p:cNvPr>
@@ -736,7 +740,7 @@
           <p:cNvPr id="4" name="Text Placeholder 3">
             <a:extLst>
               <a:ext uri="{FF2B5EF4-FFF2-40B4-BE49-F238E27FC236}">
-                <a16:creationId xmlns:a16="http://schemas.microsoft.com/office/drawing/2014/main" id="{16BB88CF-DF4F-4857-8602-72BCF5DDCDA1}"/>
+                <a16:creationId xmlns:a16="http://schemas.microsoft.com/office/drawing/2014/main" xmlns="" id="{16BB88CF-DF4F-4857-8602-72BCF5DDCDA1}"/>
               </a:ext>
             </a:extLst>
           </p:cNvPr>
@@ -807,7 +811,7 @@
           <p:cNvPr id="12" name="Straight Connector 11">
             <a:extLst>
               <a:ext uri="{FF2B5EF4-FFF2-40B4-BE49-F238E27FC236}">
-                <a16:creationId xmlns:a16="http://schemas.microsoft.com/office/drawing/2014/main" id="{A7EEBB7C-1679-4665-8688-1FA973E73DC1}"/>
+                <a16:creationId xmlns:a16="http://schemas.microsoft.com/office/drawing/2014/main" xmlns="" id="{A7EEBB7C-1679-4665-8688-1FA973E73DC1}"/>
               </a:ext>
             </a:extLst>
           </p:cNvPr>
@@ -859,7 +863,7 @@
           <p:cNvPr id="7" name="Rectangle 6">
             <a:extLst>
               <a:ext uri="{FF2B5EF4-FFF2-40B4-BE49-F238E27FC236}">
-                <a16:creationId xmlns:a16="http://schemas.microsoft.com/office/drawing/2014/main" id="{F1E3214F-3A93-4A1C-920D-D86BE35A58FB}"/>
+                <a16:creationId xmlns:a16="http://schemas.microsoft.com/office/drawing/2014/main" xmlns="" id="{F1E3214F-3A93-4A1C-920D-D86BE35A58FB}"/>
               </a:ext>
             </a:extLst>
           </p:cNvPr>
@@ -914,7 +918,7 @@
           <p:cNvPr id="3" name="Slide Number Placeholder 2">
             <a:extLst>
               <a:ext uri="{FF2B5EF4-FFF2-40B4-BE49-F238E27FC236}">
-                <a16:creationId xmlns:a16="http://schemas.microsoft.com/office/drawing/2014/main" id="{213E97E5-C83B-444A-8C07-35D699E7C342}"/>
+                <a16:creationId xmlns:a16="http://schemas.microsoft.com/office/drawing/2014/main" xmlns="" id="{213E97E5-C83B-444A-8C07-35D699E7C342}"/>
               </a:ext>
             </a:extLst>
           </p:cNvPr>
@@ -946,7 +950,7 @@
     </p:spTree>
     <p:extLst>
       <p:ext uri="{BB962C8B-B14F-4D97-AF65-F5344CB8AC3E}">
-        <p14:creationId xmlns:p14="http://schemas.microsoft.com/office/powerpoint/2010/main" val="2226532245"/>
+        <p14:creationId xmlns:p14="http://schemas.microsoft.com/office/powerpoint/2010/main" xmlns="" val="2226532245"/>
       </p:ext>
     </p:extLst>
   </p:cSld>
@@ -978,7 +982,7 @@
           <p:cNvPr id="2" name="Title 1">
             <a:extLst>
               <a:ext uri="{FF2B5EF4-FFF2-40B4-BE49-F238E27FC236}">
-                <a16:creationId xmlns:a16="http://schemas.microsoft.com/office/drawing/2014/main" id="{0D1AB651-5612-4E6A-9B35-A555D082EC2F}"/>
+                <a16:creationId xmlns:a16="http://schemas.microsoft.com/office/drawing/2014/main" xmlns="" id="{0D1AB651-5612-4E6A-9B35-A555D082EC2F}"/>
               </a:ext>
             </a:extLst>
           </p:cNvPr>
@@ -1007,7 +1011,7 @@
           <p:cNvPr id="3" name="Content Placeholder 2">
             <a:extLst>
               <a:ext uri="{FF2B5EF4-FFF2-40B4-BE49-F238E27FC236}">
-                <a16:creationId xmlns:a16="http://schemas.microsoft.com/office/drawing/2014/main" id="{881389A2-D77B-40CA-AD1E-0178AEFAD15A}"/>
+                <a16:creationId xmlns:a16="http://schemas.microsoft.com/office/drawing/2014/main" xmlns="" id="{881389A2-D77B-40CA-AD1E-0178AEFAD15A}"/>
               </a:ext>
             </a:extLst>
           </p:cNvPr>
@@ -1088,7 +1092,7 @@
           <p:cNvPr id="4" name="Content Placeholder 3">
             <a:extLst>
               <a:ext uri="{FF2B5EF4-FFF2-40B4-BE49-F238E27FC236}">
-                <a16:creationId xmlns:a16="http://schemas.microsoft.com/office/drawing/2014/main" id="{A1DCA993-CBEA-48C5-BD35-50ABDFF64065}"/>
+                <a16:creationId xmlns:a16="http://schemas.microsoft.com/office/drawing/2014/main" xmlns="" id="{A1DCA993-CBEA-48C5-BD35-50ABDFF64065}"/>
               </a:ext>
             </a:extLst>
           </p:cNvPr>
@@ -1169,7 +1173,7 @@
           <p:cNvPr id="5" name="Slide Number Placeholder 4">
             <a:extLst>
               <a:ext uri="{FF2B5EF4-FFF2-40B4-BE49-F238E27FC236}">
-                <a16:creationId xmlns:a16="http://schemas.microsoft.com/office/drawing/2014/main" id="{B88ED8E0-95EC-469F-9B7E-562FBDFDE6CC}"/>
+                <a16:creationId xmlns:a16="http://schemas.microsoft.com/office/drawing/2014/main" xmlns="" id="{B88ED8E0-95EC-469F-9B7E-562FBDFDE6CC}"/>
               </a:ext>
             </a:extLst>
           </p:cNvPr>
@@ -1201,7 +1205,7 @@
     </p:spTree>
     <p:extLst>
       <p:ext uri="{BB962C8B-B14F-4D97-AF65-F5344CB8AC3E}">
-        <p14:creationId xmlns:p14="http://schemas.microsoft.com/office/powerpoint/2010/main" val="646344805"/>
+        <p14:creationId xmlns:p14="http://schemas.microsoft.com/office/powerpoint/2010/main" xmlns="" val="646344805"/>
       </p:ext>
     </p:extLst>
   </p:cSld>
@@ -1233,7 +1237,7 @@
           <p:cNvPr id="2" name="Title 1">
             <a:extLst>
               <a:ext uri="{FF2B5EF4-FFF2-40B4-BE49-F238E27FC236}">
-                <a16:creationId xmlns:a16="http://schemas.microsoft.com/office/drawing/2014/main" id="{EF776F88-2A37-410D-A685-E455AF3D07B4}"/>
+                <a16:creationId xmlns:a16="http://schemas.microsoft.com/office/drawing/2014/main" xmlns="" id="{EF776F88-2A37-410D-A685-E455AF3D07B4}"/>
               </a:ext>
             </a:extLst>
           </p:cNvPr>
@@ -1267,7 +1271,7 @@
           <p:cNvPr id="3" name="Text Placeholder 2">
             <a:extLst>
               <a:ext uri="{FF2B5EF4-FFF2-40B4-BE49-F238E27FC236}">
-                <a16:creationId xmlns:a16="http://schemas.microsoft.com/office/drawing/2014/main" id="{6C764B46-B015-44F7-8DC0-AFB8D275E486}"/>
+                <a16:creationId xmlns:a16="http://schemas.microsoft.com/office/drawing/2014/main" xmlns="" id="{6C764B46-B015-44F7-8DC0-AFB8D275E486}"/>
               </a:ext>
             </a:extLst>
           </p:cNvPr>
@@ -1338,7 +1342,7 @@
           <p:cNvPr id="4" name="Content Placeholder 3">
             <a:extLst>
               <a:ext uri="{FF2B5EF4-FFF2-40B4-BE49-F238E27FC236}">
-                <a16:creationId xmlns:a16="http://schemas.microsoft.com/office/drawing/2014/main" id="{2D3C8232-2077-497A-9142-B787E2B03A73}"/>
+                <a16:creationId xmlns:a16="http://schemas.microsoft.com/office/drawing/2014/main" xmlns="" id="{2D3C8232-2077-497A-9142-B787E2B03A73}"/>
               </a:ext>
             </a:extLst>
           </p:cNvPr>
@@ -1419,7 +1423,7 @@
           <p:cNvPr id="5" name="Text Placeholder 4">
             <a:extLst>
               <a:ext uri="{FF2B5EF4-FFF2-40B4-BE49-F238E27FC236}">
-                <a16:creationId xmlns:a16="http://schemas.microsoft.com/office/drawing/2014/main" id="{AAF6077C-D913-4FD0-B6E0-6D70BEFD40E6}"/>
+                <a16:creationId xmlns:a16="http://schemas.microsoft.com/office/drawing/2014/main" xmlns="" id="{AAF6077C-D913-4FD0-B6E0-6D70BEFD40E6}"/>
               </a:ext>
             </a:extLst>
           </p:cNvPr>
@@ -1490,7 +1494,7 @@
           <p:cNvPr id="6" name="Content Placeholder 5">
             <a:extLst>
               <a:ext uri="{FF2B5EF4-FFF2-40B4-BE49-F238E27FC236}">
-                <a16:creationId xmlns:a16="http://schemas.microsoft.com/office/drawing/2014/main" id="{43905DBB-3AA9-4435-AC97-732293FDE7EF}"/>
+                <a16:creationId xmlns:a16="http://schemas.microsoft.com/office/drawing/2014/main" xmlns="" id="{43905DBB-3AA9-4435-AC97-732293FDE7EF}"/>
               </a:ext>
             </a:extLst>
           </p:cNvPr>
@@ -1571,7 +1575,7 @@
           <p:cNvPr id="7" name="Slide Number Placeholder 6">
             <a:extLst>
               <a:ext uri="{FF2B5EF4-FFF2-40B4-BE49-F238E27FC236}">
-                <a16:creationId xmlns:a16="http://schemas.microsoft.com/office/drawing/2014/main" id="{1954C901-FCAF-4DFB-A621-6A969641CA73}"/>
+                <a16:creationId xmlns:a16="http://schemas.microsoft.com/office/drawing/2014/main" xmlns="" id="{1954C901-FCAF-4DFB-A621-6A969641CA73}"/>
               </a:ext>
             </a:extLst>
           </p:cNvPr>
@@ -1603,7 +1607,7 @@
     </p:spTree>
     <p:extLst>
       <p:ext uri="{BB962C8B-B14F-4D97-AF65-F5344CB8AC3E}">
-        <p14:creationId xmlns:p14="http://schemas.microsoft.com/office/powerpoint/2010/main" val="2292145525"/>
+        <p14:creationId xmlns:p14="http://schemas.microsoft.com/office/powerpoint/2010/main" xmlns="" val="2292145525"/>
       </p:ext>
     </p:extLst>
   </p:cSld>
@@ -1635,7 +1639,7 @@
           <p:cNvPr id="2" name="Title 1">
             <a:extLst>
               <a:ext uri="{FF2B5EF4-FFF2-40B4-BE49-F238E27FC236}">
-                <a16:creationId xmlns:a16="http://schemas.microsoft.com/office/drawing/2014/main" id="{99AF2623-2255-4BBA-9577-B3A3FD2AE8E8}"/>
+                <a16:creationId xmlns:a16="http://schemas.microsoft.com/office/drawing/2014/main" xmlns="" id="{99AF2623-2255-4BBA-9577-B3A3FD2AE8E8}"/>
               </a:ext>
             </a:extLst>
           </p:cNvPr>
@@ -1664,7 +1668,7 @@
           <p:cNvPr id="3" name="Slide Number Placeholder 2">
             <a:extLst>
               <a:ext uri="{FF2B5EF4-FFF2-40B4-BE49-F238E27FC236}">
-                <a16:creationId xmlns:a16="http://schemas.microsoft.com/office/drawing/2014/main" id="{5259F0F0-5E7C-4FC9-8E90-6ADCD7A714B6}"/>
+                <a16:creationId xmlns:a16="http://schemas.microsoft.com/office/drawing/2014/main" xmlns="" id="{5259F0F0-5E7C-4FC9-8E90-6ADCD7A714B6}"/>
               </a:ext>
             </a:extLst>
           </p:cNvPr>
@@ -1696,7 +1700,7 @@
     </p:spTree>
     <p:extLst>
       <p:ext uri="{BB962C8B-B14F-4D97-AF65-F5344CB8AC3E}">
-        <p14:creationId xmlns:p14="http://schemas.microsoft.com/office/powerpoint/2010/main" val="3105532259"/>
+        <p14:creationId xmlns:p14="http://schemas.microsoft.com/office/powerpoint/2010/main" xmlns="" val="3105532259"/>
       </p:ext>
     </p:extLst>
   </p:cSld>
@@ -1728,7 +1732,7 @@
           <p:cNvPr id="2" name="Slide Number Placeholder 1">
             <a:extLst>
               <a:ext uri="{FF2B5EF4-FFF2-40B4-BE49-F238E27FC236}">
-                <a16:creationId xmlns:a16="http://schemas.microsoft.com/office/drawing/2014/main" id="{0A9D3FFB-BE14-4D90-A515-10EDD1BEE6F1}"/>
+                <a16:creationId xmlns:a16="http://schemas.microsoft.com/office/drawing/2014/main" xmlns="" id="{0A9D3FFB-BE14-4D90-A515-10EDD1BEE6F1}"/>
               </a:ext>
             </a:extLst>
           </p:cNvPr>
@@ -1760,7 +1764,7 @@
     </p:spTree>
     <p:extLst>
       <p:ext uri="{BB962C8B-B14F-4D97-AF65-F5344CB8AC3E}">
-        <p14:creationId xmlns:p14="http://schemas.microsoft.com/office/powerpoint/2010/main" val="3627673970"/>
+        <p14:creationId xmlns:p14="http://schemas.microsoft.com/office/powerpoint/2010/main" xmlns="" val="3627673970"/>
       </p:ext>
     </p:extLst>
   </p:cSld>
@@ -1792,7 +1796,7 @@
           <p:cNvPr id="2" name="Title 1">
             <a:extLst>
               <a:ext uri="{FF2B5EF4-FFF2-40B4-BE49-F238E27FC236}">
-                <a16:creationId xmlns:a16="http://schemas.microsoft.com/office/drawing/2014/main" id="{A2451E51-BE82-4B1B-9CB6-89C26464DBE2}"/>
+                <a16:creationId xmlns:a16="http://schemas.microsoft.com/office/drawing/2014/main" xmlns="" id="{A2451E51-BE82-4B1B-9CB6-89C26464DBE2}"/>
               </a:ext>
             </a:extLst>
           </p:cNvPr>
@@ -1830,7 +1834,7 @@
           <p:cNvPr id="3" name="Content Placeholder 2">
             <a:extLst>
               <a:ext uri="{FF2B5EF4-FFF2-40B4-BE49-F238E27FC236}">
-                <a16:creationId xmlns:a16="http://schemas.microsoft.com/office/drawing/2014/main" id="{04CCBF8C-3CF7-47E6-9AB0-15584178B449}"/>
+                <a16:creationId xmlns:a16="http://schemas.microsoft.com/office/drawing/2014/main" xmlns="" id="{04CCBF8C-3CF7-47E6-9AB0-15584178B449}"/>
               </a:ext>
             </a:extLst>
           </p:cNvPr>
@@ -1921,7 +1925,7 @@
           <p:cNvPr id="4" name="Text Placeholder 3">
             <a:extLst>
               <a:ext uri="{FF2B5EF4-FFF2-40B4-BE49-F238E27FC236}">
-                <a16:creationId xmlns:a16="http://schemas.microsoft.com/office/drawing/2014/main" id="{3D07DA3C-0298-45CF-AFC3-41031C0763E3}"/>
+                <a16:creationId xmlns:a16="http://schemas.microsoft.com/office/drawing/2014/main" xmlns="" id="{3D07DA3C-0298-45CF-AFC3-41031C0763E3}"/>
               </a:ext>
             </a:extLst>
           </p:cNvPr>
@@ -1992,7 +1996,7 @@
           <p:cNvPr id="5" name="Slide Number Placeholder 4">
             <a:extLst>
               <a:ext uri="{FF2B5EF4-FFF2-40B4-BE49-F238E27FC236}">
-                <a16:creationId xmlns:a16="http://schemas.microsoft.com/office/drawing/2014/main" id="{F7C4FF87-D01E-416B-9EF8-E107C4EDDC42}"/>
+                <a16:creationId xmlns:a16="http://schemas.microsoft.com/office/drawing/2014/main" xmlns="" id="{F7C4FF87-D01E-416B-9EF8-E107C4EDDC42}"/>
               </a:ext>
             </a:extLst>
           </p:cNvPr>
@@ -2024,7 +2028,7 @@
     </p:spTree>
     <p:extLst>
       <p:ext uri="{BB962C8B-B14F-4D97-AF65-F5344CB8AC3E}">
-        <p14:creationId xmlns:p14="http://schemas.microsoft.com/office/powerpoint/2010/main" val="398533459"/>
+        <p14:creationId xmlns:p14="http://schemas.microsoft.com/office/powerpoint/2010/main" xmlns="" val="398533459"/>
       </p:ext>
     </p:extLst>
   </p:cSld>
@@ -2056,7 +2060,7 @@
           <p:cNvPr id="2" name="Title 1">
             <a:extLst>
               <a:ext uri="{FF2B5EF4-FFF2-40B4-BE49-F238E27FC236}">
-                <a16:creationId xmlns:a16="http://schemas.microsoft.com/office/drawing/2014/main" id="{E5798B13-3B32-4354-B2B5-3165F2F6E65F}"/>
+                <a16:creationId xmlns:a16="http://schemas.microsoft.com/office/drawing/2014/main" xmlns="" id="{E5798B13-3B32-4354-B2B5-3165F2F6E65F}"/>
               </a:ext>
             </a:extLst>
           </p:cNvPr>
@@ -2099,7 +2103,7 @@
           <p:cNvPr id="4" name="Text Placeholder 3">
             <a:extLst>
               <a:ext uri="{FF2B5EF4-FFF2-40B4-BE49-F238E27FC236}">
-                <a16:creationId xmlns:a16="http://schemas.microsoft.com/office/drawing/2014/main" id="{16BB88CF-DF4F-4857-8602-72BCF5DDCDA1}"/>
+                <a16:creationId xmlns:a16="http://schemas.microsoft.com/office/drawing/2014/main" xmlns="" id="{16BB88CF-DF4F-4857-8602-72BCF5DDCDA1}"/>
               </a:ext>
             </a:extLst>
           </p:cNvPr>
@@ -2170,7 +2174,7 @@
           <p:cNvPr id="12" name="Straight Connector 11">
             <a:extLst>
               <a:ext uri="{FF2B5EF4-FFF2-40B4-BE49-F238E27FC236}">
-                <a16:creationId xmlns:a16="http://schemas.microsoft.com/office/drawing/2014/main" id="{A7EEBB7C-1679-4665-8688-1FA973E73DC1}"/>
+                <a16:creationId xmlns:a16="http://schemas.microsoft.com/office/drawing/2014/main" xmlns="" id="{A7EEBB7C-1679-4665-8688-1FA973E73DC1}"/>
               </a:ext>
             </a:extLst>
           </p:cNvPr>
@@ -2222,7 +2226,7 @@
           <p:cNvPr id="7" name="Rectangle 6">
             <a:extLst>
               <a:ext uri="{FF2B5EF4-FFF2-40B4-BE49-F238E27FC236}">
-                <a16:creationId xmlns:a16="http://schemas.microsoft.com/office/drawing/2014/main" id="{F1E3214F-3A93-4A1C-920D-D86BE35A58FB}"/>
+                <a16:creationId xmlns:a16="http://schemas.microsoft.com/office/drawing/2014/main" xmlns="" id="{F1E3214F-3A93-4A1C-920D-D86BE35A58FB}"/>
               </a:ext>
             </a:extLst>
           </p:cNvPr>
@@ -2277,7 +2281,7 @@
           <p:cNvPr id="3" name="Slide Number Placeholder 2">
             <a:extLst>
               <a:ext uri="{FF2B5EF4-FFF2-40B4-BE49-F238E27FC236}">
-                <a16:creationId xmlns:a16="http://schemas.microsoft.com/office/drawing/2014/main" id="{213E97E5-C83B-444A-8C07-35D699E7C342}"/>
+                <a16:creationId xmlns:a16="http://schemas.microsoft.com/office/drawing/2014/main" xmlns="" id="{213E97E5-C83B-444A-8C07-35D699E7C342}"/>
               </a:ext>
             </a:extLst>
           </p:cNvPr>
@@ -2311,7 +2315,7 @@
           <p:cNvPr id="8" name="Picture Placeholder 2">
             <a:extLst>
               <a:ext uri="{FF2B5EF4-FFF2-40B4-BE49-F238E27FC236}">
-                <a16:creationId xmlns:a16="http://schemas.microsoft.com/office/drawing/2014/main" id="{2641ECAC-0557-4843-8433-067E4414E2F5}"/>
+                <a16:creationId xmlns:a16="http://schemas.microsoft.com/office/drawing/2014/main" xmlns="" id="{2641ECAC-0557-4843-8433-067E4414E2F5}"/>
               </a:ext>
             </a:extLst>
           </p:cNvPr>
@@ -2387,7 +2391,7 @@
     </p:spTree>
     <p:extLst>
       <p:ext uri="{BB962C8B-B14F-4D97-AF65-F5344CB8AC3E}">
-        <p14:creationId xmlns:p14="http://schemas.microsoft.com/office/powerpoint/2010/main" val="3394383312"/>
+        <p14:creationId xmlns:p14="http://schemas.microsoft.com/office/powerpoint/2010/main" xmlns="" val="3394383312"/>
       </p:ext>
     </p:extLst>
   </p:cSld>
@@ -2430,7 +2434,7 @@
           <p:cNvPr id="2" name="Title 1">
             <a:extLst>
               <a:ext uri="{FF2B5EF4-FFF2-40B4-BE49-F238E27FC236}">
-                <a16:creationId xmlns:a16="http://schemas.microsoft.com/office/drawing/2014/main" id="{FE91AD08-4E28-4191-9B62-EAD61608E5CF}"/>
+                <a16:creationId xmlns:a16="http://schemas.microsoft.com/office/drawing/2014/main" xmlns="" id="{FE91AD08-4E28-4191-9B62-EAD61608E5CF}"/>
               </a:ext>
             </a:extLst>
           </p:cNvPr>
@@ -2478,7 +2482,7 @@
           <p:cNvPr id="3" name="Content Placeholder 2">
             <a:extLst>
               <a:ext uri="{FF2B5EF4-FFF2-40B4-BE49-F238E27FC236}">
-                <a16:creationId xmlns:a16="http://schemas.microsoft.com/office/drawing/2014/main" id="{90BF853D-76DB-46F3-AF6C-1E77C8E06AA9}"/>
+                <a16:creationId xmlns:a16="http://schemas.microsoft.com/office/drawing/2014/main" xmlns="" id="{90BF853D-76DB-46F3-AF6C-1E77C8E06AA9}"/>
               </a:ext>
             </a:extLst>
           </p:cNvPr>
@@ -2559,7 +2563,7 @@
           <p:cNvPr id="4" name="Slide Number Placeholder 3">
             <a:extLst>
               <a:ext uri="{FF2B5EF4-FFF2-40B4-BE49-F238E27FC236}">
-                <a16:creationId xmlns:a16="http://schemas.microsoft.com/office/drawing/2014/main" id="{0660D61A-B9FD-4DFF-AC42-4069DAFE238C}"/>
+                <a16:creationId xmlns:a16="http://schemas.microsoft.com/office/drawing/2014/main" xmlns="" id="{0660D61A-B9FD-4DFF-AC42-4069DAFE238C}"/>
               </a:ext>
             </a:extLst>
           </p:cNvPr>
@@ -2591,7 +2595,7 @@
     </p:spTree>
     <p:extLst>
       <p:ext uri="{BB962C8B-B14F-4D97-AF65-F5344CB8AC3E}">
-        <p14:creationId xmlns:p14="http://schemas.microsoft.com/office/powerpoint/2010/main" val="3839236654"/>
+        <p14:creationId xmlns:p14="http://schemas.microsoft.com/office/powerpoint/2010/main" xmlns="" val="3839236654"/>
       </p:ext>
     </p:extLst>
   </p:cSld>
@@ -2634,7 +2638,7 @@
           <p:cNvPr id="2" name="Title 1">
             <a:extLst>
               <a:ext uri="{FF2B5EF4-FFF2-40B4-BE49-F238E27FC236}">
-                <a16:creationId xmlns:a16="http://schemas.microsoft.com/office/drawing/2014/main" id="{FE91AD08-4E28-4191-9B62-EAD61608E5CF}"/>
+                <a16:creationId xmlns:a16="http://schemas.microsoft.com/office/drawing/2014/main" xmlns="" id="{FE91AD08-4E28-4191-9B62-EAD61608E5CF}"/>
               </a:ext>
             </a:extLst>
           </p:cNvPr>
@@ -2684,7 +2688,7 @@
           <p:cNvPr id="3" name="Content Placeholder 2">
             <a:extLst>
               <a:ext uri="{FF2B5EF4-FFF2-40B4-BE49-F238E27FC236}">
-                <a16:creationId xmlns:a16="http://schemas.microsoft.com/office/drawing/2014/main" id="{90BF853D-76DB-46F3-AF6C-1E77C8E06AA9}"/>
+                <a16:creationId xmlns:a16="http://schemas.microsoft.com/office/drawing/2014/main" xmlns="" id="{90BF853D-76DB-46F3-AF6C-1E77C8E06AA9}"/>
               </a:ext>
             </a:extLst>
           </p:cNvPr>
@@ -2765,7 +2769,7 @@
           <p:cNvPr id="4" name="Slide Number Placeholder 3">
             <a:extLst>
               <a:ext uri="{FF2B5EF4-FFF2-40B4-BE49-F238E27FC236}">
-                <a16:creationId xmlns:a16="http://schemas.microsoft.com/office/drawing/2014/main" id="{0660D61A-B9FD-4DFF-AC42-4069DAFE238C}"/>
+                <a16:creationId xmlns:a16="http://schemas.microsoft.com/office/drawing/2014/main" xmlns="" id="{0660D61A-B9FD-4DFF-AC42-4069DAFE238C}"/>
               </a:ext>
             </a:extLst>
           </p:cNvPr>
@@ -2797,7 +2801,7 @@
     </p:spTree>
     <p:extLst>
       <p:ext uri="{BB962C8B-B14F-4D97-AF65-F5344CB8AC3E}">
-        <p14:creationId xmlns:p14="http://schemas.microsoft.com/office/powerpoint/2010/main" val="1594571051"/>
+        <p14:creationId xmlns:p14="http://schemas.microsoft.com/office/powerpoint/2010/main" xmlns="" val="1594571051"/>
       </p:ext>
     </p:extLst>
   </p:cSld>
@@ -2829,7 +2833,7 @@
           <p:cNvPr id="7" name="Picture Placeholder 2">
             <a:extLst>
               <a:ext uri="{FF2B5EF4-FFF2-40B4-BE49-F238E27FC236}">
-                <a16:creationId xmlns:a16="http://schemas.microsoft.com/office/drawing/2014/main" id="{6D3C5ED2-B01D-4104-B193-BC78D76A4646}"/>
+                <a16:creationId xmlns:a16="http://schemas.microsoft.com/office/drawing/2014/main" xmlns="" id="{6D3C5ED2-B01D-4104-B193-BC78D76A4646}"/>
               </a:ext>
             </a:extLst>
           </p:cNvPr>
@@ -2902,7 +2906,7 @@
           <p:cNvPr id="2" name="Title 1">
             <a:extLst>
               <a:ext uri="{FF2B5EF4-FFF2-40B4-BE49-F238E27FC236}">
-                <a16:creationId xmlns:a16="http://schemas.microsoft.com/office/drawing/2014/main" id="{FE91AD08-4E28-4191-9B62-EAD61608E5CF}"/>
+                <a16:creationId xmlns:a16="http://schemas.microsoft.com/office/drawing/2014/main" xmlns="" id="{FE91AD08-4E28-4191-9B62-EAD61608E5CF}"/>
               </a:ext>
             </a:extLst>
           </p:cNvPr>
@@ -2949,7 +2953,7 @@
           <p:cNvPr id="3" name="Content Placeholder 2">
             <a:extLst>
               <a:ext uri="{FF2B5EF4-FFF2-40B4-BE49-F238E27FC236}">
-                <a16:creationId xmlns:a16="http://schemas.microsoft.com/office/drawing/2014/main" id="{90BF853D-76DB-46F3-AF6C-1E77C8E06AA9}"/>
+                <a16:creationId xmlns:a16="http://schemas.microsoft.com/office/drawing/2014/main" xmlns="" id="{90BF853D-76DB-46F3-AF6C-1E77C8E06AA9}"/>
               </a:ext>
             </a:extLst>
           </p:cNvPr>
@@ -3030,7 +3034,7 @@
           <p:cNvPr id="4" name="Slide Number Placeholder 3">
             <a:extLst>
               <a:ext uri="{FF2B5EF4-FFF2-40B4-BE49-F238E27FC236}">
-                <a16:creationId xmlns:a16="http://schemas.microsoft.com/office/drawing/2014/main" id="{0660D61A-B9FD-4DFF-AC42-4069DAFE238C}"/>
+                <a16:creationId xmlns:a16="http://schemas.microsoft.com/office/drawing/2014/main" xmlns="" id="{0660D61A-B9FD-4DFF-AC42-4069DAFE238C}"/>
               </a:ext>
             </a:extLst>
           </p:cNvPr>
@@ -3067,7 +3071,7 @@
     </p:spTree>
     <p:extLst>
       <p:ext uri="{BB962C8B-B14F-4D97-AF65-F5344CB8AC3E}">
-        <p14:creationId xmlns:p14="http://schemas.microsoft.com/office/powerpoint/2010/main" val="1797904098"/>
+        <p14:creationId xmlns:p14="http://schemas.microsoft.com/office/powerpoint/2010/main" xmlns="" val="1797904098"/>
       </p:ext>
     </p:extLst>
   </p:cSld>
@@ -3099,7 +3103,7 @@
           <p:cNvPr id="2" name="Title 1">
             <a:extLst>
               <a:ext uri="{FF2B5EF4-FFF2-40B4-BE49-F238E27FC236}">
-                <a16:creationId xmlns:a16="http://schemas.microsoft.com/office/drawing/2014/main" id="{FE91AD08-4E28-4191-9B62-EAD61608E5CF}"/>
+                <a16:creationId xmlns:a16="http://schemas.microsoft.com/office/drawing/2014/main" xmlns="" id="{FE91AD08-4E28-4191-9B62-EAD61608E5CF}"/>
               </a:ext>
             </a:extLst>
           </p:cNvPr>
@@ -3159,7 +3163,7 @@
           <p:cNvPr id="3" name="Content Placeholder 2">
             <a:extLst>
               <a:ext uri="{FF2B5EF4-FFF2-40B4-BE49-F238E27FC236}">
-                <a16:creationId xmlns:a16="http://schemas.microsoft.com/office/drawing/2014/main" id="{90BF853D-76DB-46F3-AF6C-1E77C8E06AA9}"/>
+                <a16:creationId xmlns:a16="http://schemas.microsoft.com/office/drawing/2014/main" xmlns="" id="{90BF853D-76DB-46F3-AF6C-1E77C8E06AA9}"/>
               </a:ext>
             </a:extLst>
           </p:cNvPr>
@@ -3240,7 +3244,7 @@
           <p:cNvPr id="14" name="Slide Number Placeholder 13">
             <a:extLst>
               <a:ext uri="{FF2B5EF4-FFF2-40B4-BE49-F238E27FC236}">
-                <a16:creationId xmlns:a16="http://schemas.microsoft.com/office/drawing/2014/main" id="{7746CAFB-2B99-470B-B55B-9BF378E3A04B}"/>
+                <a16:creationId xmlns:a16="http://schemas.microsoft.com/office/drawing/2014/main" xmlns="" id="{7746CAFB-2B99-470B-B55B-9BF378E3A04B}"/>
               </a:ext>
             </a:extLst>
           </p:cNvPr>
@@ -3272,7 +3276,7 @@
     </p:spTree>
     <p:extLst>
       <p:ext uri="{BB962C8B-B14F-4D97-AF65-F5344CB8AC3E}">
-        <p14:creationId xmlns:p14="http://schemas.microsoft.com/office/powerpoint/2010/main" val="1160496352"/>
+        <p14:creationId xmlns:p14="http://schemas.microsoft.com/office/powerpoint/2010/main" xmlns="" val="1160496352"/>
       </p:ext>
     </p:extLst>
   </p:cSld>
@@ -3304,7 +3308,7 @@
           <p:cNvPr id="17" name="Title 16">
             <a:extLst>
               <a:ext uri="{FF2B5EF4-FFF2-40B4-BE49-F238E27FC236}">
-                <a16:creationId xmlns:a16="http://schemas.microsoft.com/office/drawing/2014/main" id="{65237DA4-112F-40B2-8C8C-EB23506D9C45}"/>
+                <a16:creationId xmlns:a16="http://schemas.microsoft.com/office/drawing/2014/main" xmlns="" id="{65237DA4-112F-40B2-8C8C-EB23506D9C45}"/>
               </a:ext>
             </a:extLst>
           </p:cNvPr>
@@ -3363,7 +3367,7 @@
           <p:cNvPr id="3" name="Content Placeholder 2">
             <a:extLst>
               <a:ext uri="{FF2B5EF4-FFF2-40B4-BE49-F238E27FC236}">
-                <a16:creationId xmlns:a16="http://schemas.microsoft.com/office/drawing/2014/main" id="{90BF853D-76DB-46F3-AF6C-1E77C8E06AA9}"/>
+                <a16:creationId xmlns:a16="http://schemas.microsoft.com/office/drawing/2014/main" xmlns="" id="{90BF853D-76DB-46F3-AF6C-1E77C8E06AA9}"/>
               </a:ext>
             </a:extLst>
           </p:cNvPr>
@@ -3426,7 +3430,7 @@
           <p:cNvPr id="14" name="Slide Number Placeholder 13">
             <a:extLst>
               <a:ext uri="{FF2B5EF4-FFF2-40B4-BE49-F238E27FC236}">
-                <a16:creationId xmlns:a16="http://schemas.microsoft.com/office/drawing/2014/main" id="{7746CAFB-2B99-470B-B55B-9BF378E3A04B}"/>
+                <a16:creationId xmlns:a16="http://schemas.microsoft.com/office/drawing/2014/main" xmlns="" id="{7746CAFB-2B99-470B-B55B-9BF378E3A04B}"/>
               </a:ext>
             </a:extLst>
           </p:cNvPr>
@@ -3475,7 +3479,7 @@
     </p:spTree>
     <p:extLst>
       <p:ext uri="{BB962C8B-B14F-4D97-AF65-F5344CB8AC3E}">
-        <p14:creationId xmlns:p14="http://schemas.microsoft.com/office/powerpoint/2010/main" val="364498605"/>
+        <p14:creationId xmlns:p14="http://schemas.microsoft.com/office/powerpoint/2010/main" xmlns="" val="364498605"/>
       </p:ext>
     </p:extLst>
   </p:cSld>
@@ -3507,7 +3511,7 @@
           <p:cNvPr id="4" name="Slide Number Placeholder 3">
             <a:extLst>
               <a:ext uri="{FF2B5EF4-FFF2-40B4-BE49-F238E27FC236}">
-                <a16:creationId xmlns:a16="http://schemas.microsoft.com/office/drawing/2014/main" id="{0660D61A-B9FD-4DFF-AC42-4069DAFE238C}"/>
+                <a16:creationId xmlns:a16="http://schemas.microsoft.com/office/drawing/2014/main" xmlns="" id="{0660D61A-B9FD-4DFF-AC42-4069DAFE238C}"/>
               </a:ext>
             </a:extLst>
           </p:cNvPr>
@@ -3541,7 +3545,7 @@
           <p:cNvPr id="5" name="Content Placeholder 2">
             <a:extLst>
               <a:ext uri="{FF2B5EF4-FFF2-40B4-BE49-F238E27FC236}">
-                <a16:creationId xmlns:a16="http://schemas.microsoft.com/office/drawing/2014/main" id="{D68E6EF2-4B2F-4D0D-9505-CE92872972F7}"/>
+                <a16:creationId xmlns:a16="http://schemas.microsoft.com/office/drawing/2014/main" xmlns="" id="{D68E6EF2-4B2F-4D0D-9505-CE92872972F7}"/>
               </a:ext>
             </a:extLst>
           </p:cNvPr>
@@ -3604,7 +3608,7 @@
           <p:cNvPr id="6" name="Title 1">
             <a:extLst>
               <a:ext uri="{FF2B5EF4-FFF2-40B4-BE49-F238E27FC236}">
-                <a16:creationId xmlns:a16="http://schemas.microsoft.com/office/drawing/2014/main" id="{D91A21B9-BA54-413B-940E-027C32E4D429}"/>
+                <a16:creationId xmlns:a16="http://schemas.microsoft.com/office/drawing/2014/main" xmlns="" id="{D91A21B9-BA54-413B-940E-027C32E4D429}"/>
               </a:ext>
             </a:extLst>
           </p:cNvPr>
@@ -3650,7 +3654,7 @@
     </p:spTree>
     <p:extLst>
       <p:ext uri="{BB962C8B-B14F-4D97-AF65-F5344CB8AC3E}">
-        <p14:creationId xmlns:p14="http://schemas.microsoft.com/office/powerpoint/2010/main" val="3610051244"/>
+        <p14:creationId xmlns:p14="http://schemas.microsoft.com/office/powerpoint/2010/main" xmlns="" val="3610051244"/>
       </p:ext>
     </p:extLst>
   </p:cSld>
@@ -3682,7 +3686,7 @@
           <p:cNvPr id="2" name="Title 1">
             <a:extLst>
               <a:ext uri="{FF2B5EF4-FFF2-40B4-BE49-F238E27FC236}">
-                <a16:creationId xmlns:a16="http://schemas.microsoft.com/office/drawing/2014/main" id="{9722BDA7-8BE9-42D5-ACF1-0F51423A206E}"/>
+                <a16:creationId xmlns:a16="http://schemas.microsoft.com/office/drawing/2014/main" xmlns="" id="{9722BDA7-8BE9-42D5-ACF1-0F51423A206E}"/>
               </a:ext>
             </a:extLst>
           </p:cNvPr>
@@ -3720,7 +3724,7 @@
           <p:cNvPr id="3" name="Text Placeholder 2">
             <a:extLst>
               <a:ext uri="{FF2B5EF4-FFF2-40B4-BE49-F238E27FC236}">
-                <a16:creationId xmlns:a16="http://schemas.microsoft.com/office/drawing/2014/main" id="{71CEF73F-3CCA-4312-8E9C-2B4629DA1F66}"/>
+                <a16:creationId xmlns:a16="http://schemas.microsoft.com/office/drawing/2014/main" xmlns="" id="{71CEF73F-3CCA-4312-8E9C-2B4629DA1F66}"/>
               </a:ext>
             </a:extLst>
           </p:cNvPr>
@@ -3845,7 +3849,7 @@
           <p:cNvPr id="4" name="Slide Number Placeholder 3">
             <a:extLst>
               <a:ext uri="{FF2B5EF4-FFF2-40B4-BE49-F238E27FC236}">
-                <a16:creationId xmlns:a16="http://schemas.microsoft.com/office/drawing/2014/main" id="{293BF716-502C-4821-A3A0-19C2C508EED1}"/>
+                <a16:creationId xmlns:a16="http://schemas.microsoft.com/office/drawing/2014/main" xmlns="" id="{293BF716-502C-4821-A3A0-19C2C508EED1}"/>
               </a:ext>
             </a:extLst>
           </p:cNvPr>
@@ -3877,7 +3881,7 @@
     </p:spTree>
     <p:extLst>
       <p:ext uri="{BB962C8B-B14F-4D97-AF65-F5344CB8AC3E}">
-        <p14:creationId xmlns:p14="http://schemas.microsoft.com/office/powerpoint/2010/main" val="2665983131"/>
+        <p14:creationId xmlns:p14="http://schemas.microsoft.com/office/powerpoint/2010/main" xmlns="" val="2665983131"/>
       </p:ext>
     </p:extLst>
   </p:cSld>
@@ -3920,7 +3924,7 @@
           <p:cNvPr id="5" name="Picture 4">
             <a:extLst>
               <a:ext uri="{FF2B5EF4-FFF2-40B4-BE49-F238E27FC236}">
-                <a16:creationId xmlns:a16="http://schemas.microsoft.com/office/drawing/2014/main" id="{448E4AFE-E166-4B84-B0C8-9205038D8033}"/>
+                <a16:creationId xmlns:a16="http://schemas.microsoft.com/office/drawing/2014/main" xmlns="" id="{448E4AFE-E166-4B84-B0C8-9205038D8033}"/>
               </a:ext>
             </a:extLst>
           </p:cNvPr>
@@ -3933,7 +3937,7 @@
           <a:blip r:embed="rId16" cstate="screen">
             <a:extLst>
               <a:ext uri="{28A0092B-C50C-407E-A947-70E740481C1C}">
-                <a14:useLocalDpi xmlns:a14="http://schemas.microsoft.com/office/drawing/2010/main"/>
+                <a14:useLocalDpi xmlns:a14="http://schemas.microsoft.com/office/drawing/2010/main" xmlns=""/>
               </a:ext>
             </a:extLst>
           </a:blip>
@@ -3956,7 +3960,7 @@
           <p:cNvPr id="2" name="Title Placeholder 1">
             <a:extLst>
               <a:ext uri="{FF2B5EF4-FFF2-40B4-BE49-F238E27FC236}">
-                <a16:creationId xmlns:a16="http://schemas.microsoft.com/office/drawing/2014/main" id="{6C617517-B672-49BA-AC6E-AB66D0639A58}"/>
+                <a16:creationId xmlns:a16="http://schemas.microsoft.com/office/drawing/2014/main" xmlns="" id="{6C617517-B672-49BA-AC6E-AB66D0639A58}"/>
               </a:ext>
             </a:extLst>
           </p:cNvPr>
@@ -3995,7 +3999,7 @@
           <p:cNvPr id="3" name="Text Placeholder 2">
             <a:extLst>
               <a:ext uri="{FF2B5EF4-FFF2-40B4-BE49-F238E27FC236}">
-                <a16:creationId xmlns:a16="http://schemas.microsoft.com/office/drawing/2014/main" id="{6EC92C27-7843-4B22-9200-B7304E6AE4CD}"/>
+                <a16:creationId xmlns:a16="http://schemas.microsoft.com/office/drawing/2014/main" xmlns="" id="{6EC92C27-7843-4B22-9200-B7304E6AE4CD}"/>
               </a:ext>
             </a:extLst>
           </p:cNvPr>
@@ -4063,7 +4067,7 @@
           <p:cNvPr id="6" name="Slide Number Placeholder 5">
             <a:extLst>
               <a:ext uri="{FF2B5EF4-FFF2-40B4-BE49-F238E27FC236}">
-                <a16:creationId xmlns:a16="http://schemas.microsoft.com/office/drawing/2014/main" id="{52DB4F10-F75B-41A8-B994-BFF68949E59A}"/>
+                <a16:creationId xmlns:a16="http://schemas.microsoft.com/office/drawing/2014/main" xmlns="" id="{52DB4F10-F75B-41A8-B994-BFF68949E59A}"/>
               </a:ext>
             </a:extLst>
           </p:cNvPr>
@@ -4119,7 +4123,7 @@
           <p:cNvPr id="7" name="Rectangle 6">
             <a:extLst>
               <a:ext uri="{FF2B5EF4-FFF2-40B4-BE49-F238E27FC236}">
-                <a16:creationId xmlns:a16="http://schemas.microsoft.com/office/drawing/2014/main" id="{512D21E2-8DEB-4F43-A26E-B8DA900A9230}"/>
+                <a16:creationId xmlns:a16="http://schemas.microsoft.com/office/drawing/2014/main" xmlns="" id="{512D21E2-8DEB-4F43-A26E-B8DA900A9230}"/>
               </a:ext>
             </a:extLst>
           </p:cNvPr>
@@ -4182,7 +4186,7 @@
           <p:cNvPr id="8" name="Rectangle 7">
             <a:extLst>
               <a:ext uri="{FF2B5EF4-FFF2-40B4-BE49-F238E27FC236}">
-                <a16:creationId xmlns:a16="http://schemas.microsoft.com/office/drawing/2014/main" id="{35CD3143-7FD1-40EA-AA4A-47C72380AEC2}"/>
+                <a16:creationId xmlns:a16="http://schemas.microsoft.com/office/drawing/2014/main" xmlns="" id="{35CD3143-7FD1-40EA-AA4A-47C72380AEC2}"/>
               </a:ext>
             </a:extLst>
           </p:cNvPr>
@@ -4232,7 +4236,7 @@
     </p:spTree>
     <p:extLst>
       <p:ext uri="{BB962C8B-B14F-4D97-AF65-F5344CB8AC3E}">
-        <p14:creationId xmlns:p14="http://schemas.microsoft.com/office/powerpoint/2010/main" val="3853920126"/>
+        <p14:creationId xmlns:p14="http://schemas.microsoft.com/office/powerpoint/2010/main" xmlns="" val="3853920126"/>
       </p:ext>
     </p:extLst>
   </p:cSld>
@@ -4562,7 +4566,7 @@
           <p:cNvPr id="4" name="Title 3">
             <a:extLst>
               <a:ext uri="{FF2B5EF4-FFF2-40B4-BE49-F238E27FC236}">
-                <a16:creationId xmlns:a16="http://schemas.microsoft.com/office/drawing/2014/main" id="{E10C5037-DA4A-44E2-A9FB-84B1498768A7}"/>
+                <a16:creationId xmlns:a16="http://schemas.microsoft.com/office/drawing/2014/main" xmlns="" id="{E10C5037-DA4A-44E2-A9FB-84B1498768A7}"/>
               </a:ext>
             </a:extLst>
           </p:cNvPr>
@@ -4575,7 +4579,7 @@
         </p:nvSpPr>
         <p:spPr>
           <a:xfrm>
-            <a:off x="7416801" y="1676409"/>
+            <a:off x="7612746" y="1676409"/>
             <a:ext cx="4380810" cy="2436592"/>
           </a:xfrm>
         </p:spPr>
@@ -4585,9 +4589,14 @@
           </a:bodyPr>
           <a:lstStyle/>
           <a:p>
+            <a:pPr algn="ctr"/>
             <a:r>
               <a:rPr lang="en-US" dirty="0" smtClean="0"/>
-              <a:t>   Data Types</a:t>
+              <a:t>Data </a:t>
+            </a:r>
+            <a:r>
+              <a:rPr lang="en-US" dirty="0" smtClean="0"/>
+              <a:t>Types</a:t>
             </a:r>
             <a:endParaRPr lang="en-US" dirty="0"/>
           </a:p>
@@ -4598,7 +4607,7 @@
           <p:cNvPr id="15" name="Slide Number Placeholder 14">
             <a:extLst>
               <a:ext uri="{FF2B5EF4-FFF2-40B4-BE49-F238E27FC236}">
-                <a16:creationId xmlns:a16="http://schemas.microsoft.com/office/drawing/2014/main" id="{26F5C050-EB87-421A-8A5C-E6CB30102699}"/>
+                <a16:creationId xmlns:a16="http://schemas.microsoft.com/office/drawing/2014/main" xmlns="" id="{26F5C050-EB87-421A-8A5C-E6CB30102699}"/>
               </a:ext>
             </a:extLst>
           </p:cNvPr>
@@ -4632,7 +4641,7 @@
           <p:cNvPr id="29" name="Picture Placeholder 28" descr="Young student drawing on a whiteboard">
             <a:extLst>
               <a:ext uri="{FF2B5EF4-FFF2-40B4-BE49-F238E27FC236}">
-                <a16:creationId xmlns:a16="http://schemas.microsoft.com/office/drawing/2014/main" id="{AE2FE2E9-1D1E-404B-A659-DD19B5D66B5B}"/>
+                <a16:creationId xmlns:a16="http://schemas.microsoft.com/office/drawing/2014/main" xmlns="" id="{AE2FE2E9-1D1E-404B-A659-DD19B5D66B5B}"/>
               </a:ext>
             </a:extLst>
           </p:cNvPr>
@@ -4647,7 +4656,7 @@
           <a:blip r:embed="rId2" cstate="screen">
             <a:extLst>
               <a:ext uri="{28A0092B-C50C-407E-A947-70E740481C1C}">
-                <a14:useLocalDpi xmlns:a14="http://schemas.microsoft.com/office/drawing/2010/main"/>
+                <a14:useLocalDpi xmlns:a14="http://schemas.microsoft.com/office/drawing/2010/main" xmlns=""/>
               </a:ext>
             </a:extLst>
           </a:blip>
@@ -4666,7 +4675,7 @@
     </p:spTree>
     <p:extLst>
       <p:ext uri="{BB962C8B-B14F-4D97-AF65-F5344CB8AC3E}">
-        <p14:creationId xmlns:p14="http://schemas.microsoft.com/office/powerpoint/2010/main" val="1136250268"/>
+        <p14:creationId xmlns:p14="http://schemas.microsoft.com/office/powerpoint/2010/main" xmlns="" val="1136250268"/>
       </p:ext>
     </p:extLst>
   </p:cSld>
@@ -4705,7 +4714,7 @@
           <p:cNvPr id="2" name="Title 1">
             <a:extLst>
               <a:ext uri="{FF2B5EF4-FFF2-40B4-BE49-F238E27FC236}">
-                <a16:creationId xmlns:a16="http://schemas.microsoft.com/office/drawing/2014/main" id="{E199600F-A17E-4354-A7AB-0CC2A43A9354}"/>
+                <a16:creationId xmlns:a16="http://schemas.microsoft.com/office/drawing/2014/main" xmlns="" id="{E199600F-A17E-4354-A7AB-0CC2A43A9354}"/>
               </a:ext>
             </a:extLst>
           </p:cNvPr>
@@ -4726,9 +4735,14 @@
           <a:bodyPr/>
           <a:lstStyle/>
           <a:p>
+            <a:pPr algn="ctr"/>
             <a:r>
               <a:rPr lang="en-US" dirty="0" smtClean="0"/>
-              <a:t>                        Few points to ponder</a:t>
+              <a:t>Few </a:t>
+            </a:r>
+            <a:r>
+              <a:rPr lang="en-US" dirty="0" smtClean="0"/>
+              <a:t>points to ponder</a:t>
             </a:r>
             <a:endParaRPr lang="en-US" dirty="0"/>
           </a:p>
@@ -4739,7 +4753,7 @@
           <p:cNvPr id="3" name="Content Placeholder 2">
             <a:extLst>
               <a:ext uri="{FF2B5EF4-FFF2-40B4-BE49-F238E27FC236}">
-                <a16:creationId xmlns:a16="http://schemas.microsoft.com/office/drawing/2014/main" id="{FA6A4B49-27C8-46B6-8B11-AD7E8F615E2C}"/>
+                <a16:creationId xmlns:a16="http://schemas.microsoft.com/office/drawing/2014/main" xmlns="" id="{FA6A4B49-27C8-46B6-8B11-AD7E8F615E2C}"/>
               </a:ext>
             </a:extLst>
           </p:cNvPr>
@@ -4798,7 +4812,7 @@
           <p:cNvPr id="4" name="Slide Number Placeholder 3">
             <a:extLst>
               <a:ext uri="{FF2B5EF4-FFF2-40B4-BE49-F238E27FC236}">
-                <a16:creationId xmlns:a16="http://schemas.microsoft.com/office/drawing/2014/main" id="{62B4CE3A-8C88-45AA-A849-57E5A7AC22C1}"/>
+                <a16:creationId xmlns:a16="http://schemas.microsoft.com/office/drawing/2014/main" xmlns="" id="{62B4CE3A-8C88-45AA-A849-57E5A7AC22C1}"/>
               </a:ext>
             </a:extLst>
           </p:cNvPr>
@@ -4837,10 +4851,10 @@
           <p:cNvPr id="11" name="Rectangle 10">
             <a:extLst>
               <a:ext uri="{FF2B5EF4-FFF2-40B4-BE49-F238E27FC236}">
-                <a16:creationId xmlns:a16="http://schemas.microsoft.com/office/drawing/2014/main" id="{5F253864-26FA-4AB1-9F0A-4F57D870EE85}"/>
+                <a16:creationId xmlns:a16="http://schemas.microsoft.com/office/drawing/2014/main" xmlns="" id="{5F253864-26FA-4AB1-9F0A-4F57D870EE85}"/>
               </a:ext>
               <a:ext uri="{C183D7F6-B498-43B3-948B-1728B52AA6E4}">
-                <adec:decorative xmlns:adec="http://schemas.microsoft.com/office/drawing/2017/decorative" xmlns="" val="1"/>
+                <adec:decorative xmlns="" xmlns:adec="http://schemas.microsoft.com/office/drawing/2017/decorative" val="1"/>
               </a:ext>
             </a:extLst>
           </p:cNvPr>
@@ -4893,7 +4907,7 @@
     </p:spTree>
     <p:extLst>
       <p:ext uri="{BB962C8B-B14F-4D97-AF65-F5344CB8AC3E}">
-        <p14:creationId xmlns:p14="http://schemas.microsoft.com/office/powerpoint/2010/main" val="1136810995"/>
+        <p14:creationId xmlns:p14="http://schemas.microsoft.com/office/powerpoint/2010/main" xmlns="" val="1136810995"/>
       </p:ext>
     </p:extLst>
   </p:cSld>
@@ -4932,7 +4946,7 @@
           <p:cNvPr id="2" name="Title 1">
             <a:extLst>
               <a:ext uri="{FF2B5EF4-FFF2-40B4-BE49-F238E27FC236}">
-                <a16:creationId xmlns:a16="http://schemas.microsoft.com/office/drawing/2014/main" id="{E199600F-A17E-4354-A7AB-0CC2A43A9354}"/>
+                <a16:creationId xmlns:a16="http://schemas.microsoft.com/office/drawing/2014/main" xmlns="" id="{E199600F-A17E-4354-A7AB-0CC2A43A9354}"/>
               </a:ext>
             </a:extLst>
           </p:cNvPr>
@@ -4953,9 +4967,14 @@
           <a:bodyPr/>
           <a:lstStyle/>
           <a:p>
+            <a:pPr algn="ctr"/>
             <a:r>
               <a:rPr lang="en-US" dirty="0" smtClean="0"/>
-              <a:t>              Widening &amp; Narrowing Conversions.</a:t>
+              <a:t>Widening </a:t>
+            </a:r>
+            <a:r>
+              <a:rPr lang="en-US" dirty="0" smtClean="0"/>
+              <a:t>&amp; Narrowing Conversions.</a:t>
             </a:r>
             <a:endParaRPr lang="en-US" dirty="0"/>
           </a:p>
@@ -4966,7 +4985,7 @@
           <p:cNvPr id="3" name="Content Placeholder 2">
             <a:extLst>
               <a:ext uri="{FF2B5EF4-FFF2-40B4-BE49-F238E27FC236}">
-                <a16:creationId xmlns:a16="http://schemas.microsoft.com/office/drawing/2014/main" id="{FA6A4B49-27C8-46B6-8B11-AD7E8F615E2C}"/>
+                <a16:creationId xmlns:a16="http://schemas.microsoft.com/office/drawing/2014/main" xmlns="" id="{FA6A4B49-27C8-46B6-8B11-AD7E8F615E2C}"/>
               </a:ext>
             </a:extLst>
           </p:cNvPr>
@@ -5022,7 +5041,7 @@
           <p:cNvPr id="4" name="Slide Number Placeholder 3">
             <a:extLst>
               <a:ext uri="{FF2B5EF4-FFF2-40B4-BE49-F238E27FC236}">
-                <a16:creationId xmlns:a16="http://schemas.microsoft.com/office/drawing/2014/main" id="{62B4CE3A-8C88-45AA-A849-57E5A7AC22C1}"/>
+                <a16:creationId xmlns:a16="http://schemas.microsoft.com/office/drawing/2014/main" xmlns="" id="{62B4CE3A-8C88-45AA-A849-57E5A7AC22C1}"/>
               </a:ext>
             </a:extLst>
           </p:cNvPr>
@@ -5061,10 +5080,10 @@
           <p:cNvPr id="11" name="Rectangle 10">
             <a:extLst>
               <a:ext uri="{FF2B5EF4-FFF2-40B4-BE49-F238E27FC236}">
-                <a16:creationId xmlns:a16="http://schemas.microsoft.com/office/drawing/2014/main" id="{5F253864-26FA-4AB1-9F0A-4F57D870EE85}"/>
+                <a16:creationId xmlns:a16="http://schemas.microsoft.com/office/drawing/2014/main" xmlns="" id="{5F253864-26FA-4AB1-9F0A-4F57D870EE85}"/>
               </a:ext>
               <a:ext uri="{C183D7F6-B498-43B3-948B-1728B52AA6E4}">
-                <adec:decorative xmlns:adec="http://schemas.microsoft.com/office/drawing/2017/decorative" xmlns="" val="1"/>
+                <adec:decorative xmlns="" xmlns:adec="http://schemas.microsoft.com/office/drawing/2017/decorative" val="1"/>
               </a:ext>
             </a:extLst>
           </p:cNvPr>
@@ -5117,7 +5136,7 @@
     </p:spTree>
     <p:extLst>
       <p:ext uri="{BB962C8B-B14F-4D97-AF65-F5344CB8AC3E}">
-        <p14:creationId xmlns:p14="http://schemas.microsoft.com/office/powerpoint/2010/main" val="1677225965"/>
+        <p14:creationId xmlns:p14="http://schemas.microsoft.com/office/powerpoint/2010/main" xmlns="" val="1677225965"/>
       </p:ext>
     </p:extLst>
   </p:cSld>
@@ -5156,7 +5175,7 @@
           <p:cNvPr id="2" name="Title 1">
             <a:extLst>
               <a:ext uri="{FF2B5EF4-FFF2-40B4-BE49-F238E27FC236}">
-                <a16:creationId xmlns:a16="http://schemas.microsoft.com/office/drawing/2014/main" id="{E199600F-A17E-4354-A7AB-0CC2A43A9354}"/>
+                <a16:creationId xmlns:a16="http://schemas.microsoft.com/office/drawing/2014/main" xmlns="" id="{E199600F-A17E-4354-A7AB-0CC2A43A9354}"/>
               </a:ext>
             </a:extLst>
           </p:cNvPr>
@@ -5177,9 +5196,14 @@
           <a:bodyPr/>
           <a:lstStyle/>
           <a:p>
+            <a:pPr algn="ctr"/>
             <a:r>
               <a:rPr lang="en-US" dirty="0" smtClean="0"/>
-              <a:t>                     Compile time constants</a:t>
+              <a:t>Compile </a:t>
+            </a:r>
+            <a:r>
+              <a:rPr lang="en-US" dirty="0" smtClean="0"/>
+              <a:t>time constants</a:t>
             </a:r>
             <a:endParaRPr lang="en-US" dirty="0"/>
           </a:p>
@@ -5190,7 +5214,7 @@
           <p:cNvPr id="3" name="Content Placeholder 2">
             <a:extLst>
               <a:ext uri="{FF2B5EF4-FFF2-40B4-BE49-F238E27FC236}">
-                <a16:creationId xmlns:a16="http://schemas.microsoft.com/office/drawing/2014/main" id="{FA6A4B49-27C8-46B6-8B11-AD7E8F615E2C}"/>
+                <a16:creationId xmlns:a16="http://schemas.microsoft.com/office/drawing/2014/main" xmlns="" id="{FA6A4B49-27C8-46B6-8B11-AD7E8F615E2C}"/>
               </a:ext>
             </a:extLst>
           </p:cNvPr>
@@ -5285,7 +5309,7 @@
           <p:cNvPr id="4" name="Slide Number Placeholder 3">
             <a:extLst>
               <a:ext uri="{FF2B5EF4-FFF2-40B4-BE49-F238E27FC236}">
-                <a16:creationId xmlns:a16="http://schemas.microsoft.com/office/drawing/2014/main" id="{62B4CE3A-8C88-45AA-A849-57E5A7AC22C1}"/>
+                <a16:creationId xmlns:a16="http://schemas.microsoft.com/office/drawing/2014/main" xmlns="" id="{62B4CE3A-8C88-45AA-A849-57E5A7AC22C1}"/>
               </a:ext>
             </a:extLst>
           </p:cNvPr>
@@ -5324,10 +5348,10 @@
           <p:cNvPr id="11" name="Rectangle 10">
             <a:extLst>
               <a:ext uri="{FF2B5EF4-FFF2-40B4-BE49-F238E27FC236}">
-                <a16:creationId xmlns:a16="http://schemas.microsoft.com/office/drawing/2014/main" id="{5F253864-26FA-4AB1-9F0A-4F57D870EE85}"/>
+                <a16:creationId xmlns:a16="http://schemas.microsoft.com/office/drawing/2014/main" xmlns="" id="{5F253864-26FA-4AB1-9F0A-4F57D870EE85}"/>
               </a:ext>
               <a:ext uri="{C183D7F6-B498-43B3-948B-1728B52AA6E4}">
-                <adec:decorative xmlns:adec="http://schemas.microsoft.com/office/drawing/2017/decorative" xmlns="" val="1"/>
+                <adec:decorative xmlns="" xmlns:adec="http://schemas.microsoft.com/office/drawing/2017/decorative" val="1"/>
               </a:ext>
             </a:extLst>
           </p:cNvPr>
@@ -5389,7 +5413,7 @@
           <a:blip r:embed="rId2">
             <a:extLst>
               <a:ext uri="{28A0092B-C50C-407E-A947-70E740481C1C}">
-                <a14:useLocalDpi xmlns:a14="http://schemas.microsoft.com/office/drawing/2010/main" val="0"/>
+                <a14:useLocalDpi xmlns:a14="http://schemas.microsoft.com/office/drawing/2010/main" xmlns="" val="0"/>
               </a:ext>
             </a:extLst>
           </a:blip>
@@ -5419,7 +5443,7 @@
           <a:blip r:embed="rId3">
             <a:extLst>
               <a:ext uri="{28A0092B-C50C-407E-A947-70E740481C1C}">
-                <a14:useLocalDpi xmlns:a14="http://schemas.microsoft.com/office/drawing/2010/main" val="0"/>
+                <a14:useLocalDpi xmlns:a14="http://schemas.microsoft.com/office/drawing/2010/main" xmlns="" val="0"/>
               </a:ext>
             </a:extLst>
           </a:blip>
@@ -5440,7 +5464,7 @@
     </p:spTree>
     <p:extLst>
       <p:ext uri="{BB962C8B-B14F-4D97-AF65-F5344CB8AC3E}">
-        <p14:creationId xmlns:p14="http://schemas.microsoft.com/office/powerpoint/2010/main" val="2944664186"/>
+        <p14:creationId xmlns:p14="http://schemas.microsoft.com/office/powerpoint/2010/main" xmlns="" val="2944664186"/>
       </p:ext>
     </p:extLst>
   </p:cSld>
@@ -5479,7 +5503,7 @@
           <p:cNvPr id="2" name="Title 1">
             <a:extLst>
               <a:ext uri="{FF2B5EF4-FFF2-40B4-BE49-F238E27FC236}">
-                <a16:creationId xmlns:a16="http://schemas.microsoft.com/office/drawing/2014/main" id="{C8F58AE6-56F6-44E8-8BBF-23277B1773E4}"/>
+                <a16:creationId xmlns:a16="http://schemas.microsoft.com/office/drawing/2014/main" xmlns="" id="{C8F58AE6-56F6-44E8-8BBF-23277B1773E4}"/>
               </a:ext>
             </a:extLst>
           </p:cNvPr>
@@ -5495,8 +5519,9 @@
           <a:bodyPr/>
           <a:lstStyle/>
           <a:p>
-            <a:r>
-              <a:rPr lang="en-US" smtClean="0"/>
+            <a:pPr algn="ctr"/>
+            <a:r>
+              <a:rPr lang="en-US" dirty="0" smtClean="0"/>
               <a:t>Questions ??</a:t>
             </a:r>
             <a:endParaRPr lang="en-US" dirty="0"/>
@@ -5517,7 +5542,7 @@
           <a:blip r:embed="rId2">
             <a:extLst>
               <a:ext uri="{28A0092B-C50C-407E-A947-70E740481C1C}">
-                <a14:useLocalDpi xmlns:a14="http://schemas.microsoft.com/office/drawing/2010/main" val="0"/>
+                <a14:useLocalDpi xmlns:a14="http://schemas.microsoft.com/office/drawing/2010/main" xmlns="" val="0"/>
               </a:ext>
             </a:extLst>
           </a:blip>
@@ -5537,7 +5562,7 @@
           <p:cNvPr id="20" name="Slide Number Placeholder 19">
             <a:extLst>
               <a:ext uri="{FF2B5EF4-FFF2-40B4-BE49-F238E27FC236}">
-                <a16:creationId xmlns:a16="http://schemas.microsoft.com/office/drawing/2014/main" id="{3AEC0301-E9AA-4478-9E23-C372DBDCE653}"/>
+                <a16:creationId xmlns:a16="http://schemas.microsoft.com/office/drawing/2014/main" xmlns="" id="{3AEC0301-E9AA-4478-9E23-C372DBDCE653}"/>
               </a:ext>
             </a:extLst>
           </p:cNvPr>
@@ -5576,10 +5601,10 @@
           <p:cNvPr id="10" name="Isosceles Triangle 9">
             <a:extLst>
               <a:ext uri="{FF2B5EF4-FFF2-40B4-BE49-F238E27FC236}">
-                <a16:creationId xmlns:a16="http://schemas.microsoft.com/office/drawing/2014/main" id="{792980D7-ED01-4955-83DB-59BA18C94FBA}"/>
+                <a16:creationId xmlns:a16="http://schemas.microsoft.com/office/drawing/2014/main" xmlns="" id="{792980D7-ED01-4955-83DB-59BA18C94FBA}"/>
               </a:ext>
               <a:ext uri="{C183D7F6-B498-43B3-948B-1728B52AA6E4}">
-                <adec:decorative xmlns:adec="http://schemas.microsoft.com/office/drawing/2017/decorative" xmlns="" val="1"/>
+                <adec:decorative xmlns="" xmlns:adec="http://schemas.microsoft.com/office/drawing/2017/decorative" val="1"/>
               </a:ext>
             </a:extLst>
           </p:cNvPr>
@@ -5657,7 +5682,7 @@
     </p:spTree>
     <p:extLst>
       <p:ext uri="{BB962C8B-B14F-4D97-AF65-F5344CB8AC3E}">
-        <p14:creationId xmlns:p14="http://schemas.microsoft.com/office/powerpoint/2010/main" val="1704949556"/>
+        <p14:creationId xmlns:p14="http://schemas.microsoft.com/office/powerpoint/2010/main" xmlns="" val="1704949556"/>
       </p:ext>
     </p:extLst>
   </p:cSld>
@@ -5696,7 +5721,7 @@
           <p:cNvPr id="2" name="Title 1">
             <a:extLst>
               <a:ext uri="{FF2B5EF4-FFF2-40B4-BE49-F238E27FC236}">
-                <a16:creationId xmlns:a16="http://schemas.microsoft.com/office/drawing/2014/main" id="{E199600F-A17E-4354-A7AB-0CC2A43A9354}"/>
+                <a16:creationId xmlns:a16="http://schemas.microsoft.com/office/drawing/2014/main" xmlns="" id="{E199600F-A17E-4354-A7AB-0CC2A43A9354}"/>
               </a:ext>
             </a:extLst>
           </p:cNvPr>
@@ -5717,9 +5742,14 @@
           <a:bodyPr/>
           <a:lstStyle/>
           <a:p>
+            <a:pPr algn="ctr"/>
             <a:r>
               <a:rPr lang="en-US" dirty="0" smtClean="0"/>
-              <a:t>                             Exam Objectives</a:t>
+              <a:t>Exam </a:t>
+            </a:r>
+            <a:r>
+              <a:rPr lang="en-US" dirty="0" smtClean="0"/>
+              <a:t>Objectives</a:t>
             </a:r>
             <a:endParaRPr lang="en-US" dirty="0"/>
           </a:p>
@@ -5730,7 +5760,7 @@
           <p:cNvPr id="3" name="Content Placeholder 2">
             <a:extLst>
               <a:ext uri="{FF2B5EF4-FFF2-40B4-BE49-F238E27FC236}">
-                <a16:creationId xmlns:a16="http://schemas.microsoft.com/office/drawing/2014/main" id="{FA6A4B49-27C8-46B6-8B11-AD7E8F615E2C}"/>
+                <a16:creationId xmlns:a16="http://schemas.microsoft.com/office/drawing/2014/main" xmlns="" id="{FA6A4B49-27C8-46B6-8B11-AD7E8F615E2C}"/>
               </a:ext>
             </a:extLst>
           </p:cNvPr>
@@ -5755,16 +5785,15 @@
           </a:p>
           <a:p>
             <a:r>
-              <a:rPr lang="en-US" sz="2400" b="1" dirty="0" smtClean="0"/>
-              <a:t>Using </a:t>
-            </a:r>
-            <a:r>
-              <a:rPr lang="en-US" sz="2400" b="1" dirty="0"/>
-              <a:t>Operators and Decision Constructs</a:t>
-            </a:r>
-          </a:p>
-          <a:p>
-            <a:pPr lvl="1"/>
+              <a:rPr lang="en-IN" sz="2400" b="1" dirty="0" smtClean="0"/>
+              <a:t>Working With Java Primitive Data </a:t>
+            </a:r>
+            <a:r>
+              <a:rPr lang="en-IN" sz="2400" b="1" dirty="0" smtClean="0"/>
+              <a:t>Types</a:t>
+            </a:r>
+          </a:p>
+          <a:p>
             <a:endParaRPr lang="en-US" sz="2400" dirty="0" smtClean="0"/>
           </a:p>
           <a:p>
@@ -5799,7 +5828,7 @@
           <p:cNvPr id="4" name="Slide Number Placeholder 3">
             <a:extLst>
               <a:ext uri="{FF2B5EF4-FFF2-40B4-BE49-F238E27FC236}">
-                <a16:creationId xmlns:a16="http://schemas.microsoft.com/office/drawing/2014/main" id="{62B4CE3A-8C88-45AA-A849-57E5A7AC22C1}"/>
+                <a16:creationId xmlns:a16="http://schemas.microsoft.com/office/drawing/2014/main" xmlns="" id="{62B4CE3A-8C88-45AA-A849-57E5A7AC22C1}"/>
               </a:ext>
             </a:extLst>
           </p:cNvPr>
@@ -5838,10 +5867,10 @@
           <p:cNvPr id="11" name="Rectangle 10">
             <a:extLst>
               <a:ext uri="{FF2B5EF4-FFF2-40B4-BE49-F238E27FC236}">
-                <a16:creationId xmlns:a16="http://schemas.microsoft.com/office/drawing/2014/main" id="{5F253864-26FA-4AB1-9F0A-4F57D870EE85}"/>
+                <a16:creationId xmlns:a16="http://schemas.microsoft.com/office/drawing/2014/main" xmlns="" id="{5F253864-26FA-4AB1-9F0A-4F57D870EE85}"/>
               </a:ext>
               <a:ext uri="{C183D7F6-B498-43B3-948B-1728B52AA6E4}">
-                <adec:decorative xmlns:adec="http://schemas.microsoft.com/office/drawing/2017/decorative" xmlns="" val="1"/>
+                <adec:decorative xmlns="" xmlns:adec="http://schemas.microsoft.com/office/drawing/2017/decorative" val="1"/>
               </a:ext>
             </a:extLst>
           </p:cNvPr>
@@ -5903,7 +5932,7 @@
           <a:blip r:embed="rId2" cstate="print">
             <a:extLst>
               <a:ext uri="{28A0092B-C50C-407E-A947-70E740481C1C}">
-                <a14:useLocalDpi xmlns:a14="http://schemas.microsoft.com/office/drawing/2010/main" val="0"/>
+                <a14:useLocalDpi xmlns:a14="http://schemas.microsoft.com/office/drawing/2010/main" xmlns="" val="0"/>
               </a:ext>
             </a:extLst>
           </a:blip>
@@ -5924,7 +5953,7 @@
     </p:spTree>
     <p:extLst>
       <p:ext uri="{BB962C8B-B14F-4D97-AF65-F5344CB8AC3E}">
-        <p14:creationId xmlns:p14="http://schemas.microsoft.com/office/powerpoint/2010/main" val="1281103274"/>
+        <p14:creationId xmlns:p14="http://schemas.microsoft.com/office/powerpoint/2010/main" xmlns="" val="1281103274"/>
       </p:ext>
     </p:extLst>
   </p:cSld>
@@ -5963,7 +5992,7 @@
           <p:cNvPr id="2" name="Title 1">
             <a:extLst>
               <a:ext uri="{FF2B5EF4-FFF2-40B4-BE49-F238E27FC236}">
-                <a16:creationId xmlns:a16="http://schemas.microsoft.com/office/drawing/2014/main" id="{E199600F-A17E-4354-A7AB-0CC2A43A9354}"/>
+                <a16:creationId xmlns:a16="http://schemas.microsoft.com/office/drawing/2014/main" xmlns="" id="{E199600F-A17E-4354-A7AB-0CC2A43A9354}"/>
               </a:ext>
             </a:extLst>
           </p:cNvPr>
@@ -5984,9 +6013,14 @@
           <a:bodyPr/>
           <a:lstStyle/>
           <a:p>
+            <a:pPr algn="ctr"/>
             <a:r>
               <a:rPr lang="en-US" dirty="0" smtClean="0"/>
-              <a:t>                             Data &amp; Types</a:t>
+              <a:t>Data </a:t>
+            </a:r>
+            <a:r>
+              <a:rPr lang="en-US" dirty="0" smtClean="0"/>
+              <a:t>&amp; Types</a:t>
             </a:r>
             <a:endParaRPr lang="en-US" dirty="0"/>
           </a:p>
@@ -6102,7 +6136,7 @@
           <p:cNvPr id="4" name="Slide Number Placeholder 3">
             <a:extLst>
               <a:ext uri="{FF2B5EF4-FFF2-40B4-BE49-F238E27FC236}">
-                <a16:creationId xmlns:a16="http://schemas.microsoft.com/office/drawing/2014/main" id="{62B4CE3A-8C88-45AA-A849-57E5A7AC22C1}"/>
+                <a16:creationId xmlns:a16="http://schemas.microsoft.com/office/drawing/2014/main" xmlns="" id="{62B4CE3A-8C88-45AA-A849-57E5A7AC22C1}"/>
               </a:ext>
             </a:extLst>
           </p:cNvPr>
@@ -6136,10 +6170,10 @@
           <p:cNvPr id="11" name="Rectangle 10">
             <a:extLst>
               <a:ext uri="{FF2B5EF4-FFF2-40B4-BE49-F238E27FC236}">
-                <a16:creationId xmlns:a16="http://schemas.microsoft.com/office/drawing/2014/main" id="{5F253864-26FA-4AB1-9F0A-4F57D870EE85}"/>
+                <a16:creationId xmlns:a16="http://schemas.microsoft.com/office/drawing/2014/main" xmlns="" id="{5F253864-26FA-4AB1-9F0A-4F57D870EE85}"/>
               </a:ext>
               <a:ext uri="{C183D7F6-B498-43B3-948B-1728B52AA6E4}">
-                <adec:decorative xmlns:adec="http://schemas.microsoft.com/office/drawing/2017/decorative" xmlns="" val="1"/>
+                <adec:decorative xmlns="" xmlns:adec="http://schemas.microsoft.com/office/drawing/2017/decorative" val="1"/>
               </a:ext>
             </a:extLst>
           </p:cNvPr>
@@ -6192,7 +6226,7 @@
     </p:spTree>
     <p:extLst>
       <p:ext uri="{BB962C8B-B14F-4D97-AF65-F5344CB8AC3E}">
-        <p14:creationId xmlns:p14="http://schemas.microsoft.com/office/powerpoint/2010/main" val="1287735390"/>
+        <p14:creationId xmlns:p14="http://schemas.microsoft.com/office/powerpoint/2010/main" xmlns="" val="1287735390"/>
       </p:ext>
     </p:extLst>
   </p:cSld>
@@ -6231,7 +6265,7 @@
           <p:cNvPr id="2" name="Title 1">
             <a:extLst>
               <a:ext uri="{FF2B5EF4-FFF2-40B4-BE49-F238E27FC236}">
-                <a16:creationId xmlns:a16="http://schemas.microsoft.com/office/drawing/2014/main" id="{E199600F-A17E-4354-A7AB-0CC2A43A9354}"/>
+                <a16:creationId xmlns:a16="http://schemas.microsoft.com/office/drawing/2014/main" xmlns="" id="{E199600F-A17E-4354-A7AB-0CC2A43A9354}"/>
               </a:ext>
             </a:extLst>
           </p:cNvPr>
@@ -6252,9 +6286,10 @@
           <a:bodyPr/>
           <a:lstStyle/>
           <a:p>
+            <a:pPr algn="ctr"/>
             <a:r>
               <a:rPr lang="en-US" dirty="0" smtClean="0"/>
-              <a:t>                                      Package</a:t>
+              <a:t>Package</a:t>
             </a:r>
             <a:endParaRPr lang="en-US" dirty="0"/>
           </a:p>
@@ -6265,7 +6300,7 @@
           <p:cNvPr id="3" name="Content Placeholder 2">
             <a:extLst>
               <a:ext uri="{FF2B5EF4-FFF2-40B4-BE49-F238E27FC236}">
-                <a16:creationId xmlns:a16="http://schemas.microsoft.com/office/drawing/2014/main" id="{FA6A4B49-27C8-46B6-8B11-AD7E8F615E2C}"/>
+                <a16:creationId xmlns:a16="http://schemas.microsoft.com/office/drawing/2014/main" xmlns="" id="{FA6A4B49-27C8-46B6-8B11-AD7E8F615E2C}"/>
               </a:ext>
             </a:extLst>
           </p:cNvPr>
@@ -6295,7 +6330,7 @@
           <p:cNvPr id="4" name="Slide Number Placeholder 3">
             <a:extLst>
               <a:ext uri="{FF2B5EF4-FFF2-40B4-BE49-F238E27FC236}">
-                <a16:creationId xmlns:a16="http://schemas.microsoft.com/office/drawing/2014/main" id="{62B4CE3A-8C88-45AA-A849-57E5A7AC22C1}"/>
+                <a16:creationId xmlns:a16="http://schemas.microsoft.com/office/drawing/2014/main" xmlns="" id="{62B4CE3A-8C88-45AA-A849-57E5A7AC22C1}"/>
               </a:ext>
             </a:extLst>
           </p:cNvPr>
@@ -6334,10 +6369,10 @@
           <p:cNvPr id="11" name="Rectangle 10">
             <a:extLst>
               <a:ext uri="{FF2B5EF4-FFF2-40B4-BE49-F238E27FC236}">
-                <a16:creationId xmlns:a16="http://schemas.microsoft.com/office/drawing/2014/main" id="{5F253864-26FA-4AB1-9F0A-4F57D870EE85}"/>
+                <a16:creationId xmlns:a16="http://schemas.microsoft.com/office/drawing/2014/main" xmlns="" id="{5F253864-26FA-4AB1-9F0A-4F57D870EE85}"/>
               </a:ext>
               <a:ext uri="{C183D7F6-B498-43B3-948B-1728B52AA6E4}">
-                <adec:decorative xmlns:adec="http://schemas.microsoft.com/office/drawing/2017/decorative" xmlns="" val="1"/>
+                <adec:decorative xmlns="" xmlns:adec="http://schemas.microsoft.com/office/drawing/2017/decorative" val="1"/>
               </a:ext>
             </a:extLst>
           </p:cNvPr>
@@ -6399,7 +6434,7 @@
           <a:blip r:embed="rId2">
             <a:extLst>
               <a:ext uri="{28A0092B-C50C-407E-A947-70E740481C1C}">
-                <a14:useLocalDpi xmlns:a14="http://schemas.microsoft.com/office/drawing/2010/main" val="0"/>
+                <a14:useLocalDpi xmlns:a14="http://schemas.microsoft.com/office/drawing/2010/main" xmlns="" val="0"/>
               </a:ext>
             </a:extLst>
           </a:blip>
@@ -6420,7 +6455,7 @@
     </p:spTree>
     <p:extLst>
       <p:ext uri="{BB962C8B-B14F-4D97-AF65-F5344CB8AC3E}">
-        <p14:creationId xmlns:p14="http://schemas.microsoft.com/office/powerpoint/2010/main" val="1894288286"/>
+        <p14:creationId xmlns:p14="http://schemas.microsoft.com/office/powerpoint/2010/main" xmlns="" val="1894288286"/>
       </p:ext>
     </p:extLst>
   </p:cSld>
@@ -6459,7 +6494,7 @@
           <p:cNvPr id="2" name="Title 1">
             <a:extLst>
               <a:ext uri="{FF2B5EF4-FFF2-40B4-BE49-F238E27FC236}">
-                <a16:creationId xmlns:a16="http://schemas.microsoft.com/office/drawing/2014/main" id="{E199600F-A17E-4354-A7AB-0CC2A43A9354}"/>
+                <a16:creationId xmlns:a16="http://schemas.microsoft.com/office/drawing/2014/main" xmlns="" id="{E199600F-A17E-4354-A7AB-0CC2A43A9354}"/>
               </a:ext>
             </a:extLst>
           </p:cNvPr>
@@ -6480,9 +6515,14 @@
           <a:bodyPr/>
           <a:lstStyle/>
           <a:p>
+            <a:pPr algn="ctr"/>
             <a:r>
               <a:rPr lang="en-US" dirty="0" smtClean="0"/>
-              <a:t>                          Integral Data Types</a:t>
+              <a:t>Integral </a:t>
+            </a:r>
+            <a:r>
+              <a:rPr lang="en-US" dirty="0" smtClean="0"/>
+              <a:t>Data Types</a:t>
             </a:r>
             <a:endParaRPr lang="en-US" dirty="0"/>
           </a:p>
@@ -6493,7 +6533,7 @@
           <p:cNvPr id="3" name="Content Placeholder 2">
             <a:extLst>
               <a:ext uri="{FF2B5EF4-FFF2-40B4-BE49-F238E27FC236}">
-                <a16:creationId xmlns:a16="http://schemas.microsoft.com/office/drawing/2014/main" id="{FA6A4B49-27C8-46B6-8B11-AD7E8F615E2C}"/>
+                <a16:creationId xmlns:a16="http://schemas.microsoft.com/office/drawing/2014/main" xmlns="" id="{FA6A4B49-27C8-46B6-8B11-AD7E8F615E2C}"/>
               </a:ext>
             </a:extLst>
           </p:cNvPr>
@@ -6580,7 +6620,7 @@
           <p:cNvPr id="4" name="Slide Number Placeholder 3">
             <a:extLst>
               <a:ext uri="{FF2B5EF4-FFF2-40B4-BE49-F238E27FC236}">
-                <a16:creationId xmlns:a16="http://schemas.microsoft.com/office/drawing/2014/main" id="{62B4CE3A-8C88-45AA-A849-57E5A7AC22C1}"/>
+                <a16:creationId xmlns:a16="http://schemas.microsoft.com/office/drawing/2014/main" xmlns="" id="{62B4CE3A-8C88-45AA-A849-57E5A7AC22C1}"/>
               </a:ext>
             </a:extLst>
           </p:cNvPr>
@@ -6619,10 +6659,10 @@
           <p:cNvPr id="11" name="Rectangle 10">
             <a:extLst>
               <a:ext uri="{FF2B5EF4-FFF2-40B4-BE49-F238E27FC236}">
-                <a16:creationId xmlns:a16="http://schemas.microsoft.com/office/drawing/2014/main" id="{5F253864-26FA-4AB1-9F0A-4F57D870EE85}"/>
+                <a16:creationId xmlns:a16="http://schemas.microsoft.com/office/drawing/2014/main" xmlns="" id="{5F253864-26FA-4AB1-9F0A-4F57D870EE85}"/>
               </a:ext>
               <a:ext uri="{C183D7F6-B498-43B3-948B-1728B52AA6E4}">
-                <adec:decorative xmlns:adec="http://schemas.microsoft.com/office/drawing/2017/decorative" xmlns="" val="1"/>
+                <adec:decorative xmlns="" xmlns:adec="http://schemas.microsoft.com/office/drawing/2017/decorative" val="1"/>
               </a:ext>
             </a:extLst>
           </p:cNvPr>
@@ -6684,7 +6724,7 @@
           <a:blip r:embed="rId2">
             <a:extLst>
               <a:ext uri="{28A0092B-C50C-407E-A947-70E740481C1C}">
-                <a14:useLocalDpi xmlns:a14="http://schemas.microsoft.com/office/drawing/2010/main" val="0"/>
+                <a14:useLocalDpi xmlns:a14="http://schemas.microsoft.com/office/drawing/2010/main" xmlns="" val="0"/>
               </a:ext>
             </a:extLst>
           </a:blip>
@@ -6705,7 +6745,7 @@
     </p:spTree>
     <p:extLst>
       <p:ext uri="{BB962C8B-B14F-4D97-AF65-F5344CB8AC3E}">
-        <p14:creationId xmlns:p14="http://schemas.microsoft.com/office/powerpoint/2010/main" val="1533683092"/>
+        <p14:creationId xmlns:p14="http://schemas.microsoft.com/office/powerpoint/2010/main" xmlns="" val="1533683092"/>
       </p:ext>
     </p:extLst>
   </p:cSld>
@@ -6744,7 +6784,7 @@
           <p:cNvPr id="2" name="Title 1">
             <a:extLst>
               <a:ext uri="{FF2B5EF4-FFF2-40B4-BE49-F238E27FC236}">
-                <a16:creationId xmlns:a16="http://schemas.microsoft.com/office/drawing/2014/main" id="{E199600F-A17E-4354-A7AB-0CC2A43A9354}"/>
+                <a16:creationId xmlns:a16="http://schemas.microsoft.com/office/drawing/2014/main" xmlns="" id="{E199600F-A17E-4354-A7AB-0CC2A43A9354}"/>
               </a:ext>
             </a:extLst>
           </p:cNvPr>
@@ -6765,9 +6805,14 @@
           <a:bodyPr/>
           <a:lstStyle/>
           <a:p>
+            <a:pPr algn="ctr"/>
             <a:r>
               <a:rPr lang="en-US" dirty="0" smtClean="0"/>
-              <a:t>                           Char: A special case.</a:t>
+              <a:t>Char</a:t>
+            </a:r>
+            <a:r>
+              <a:rPr lang="en-US" dirty="0" smtClean="0"/>
+              <a:t>: A special case.</a:t>
             </a:r>
             <a:endParaRPr lang="en-US" dirty="0"/>
           </a:p>
@@ -6778,7 +6823,7 @@
           <p:cNvPr id="3" name="Content Placeholder 2">
             <a:extLst>
               <a:ext uri="{FF2B5EF4-FFF2-40B4-BE49-F238E27FC236}">
-                <a16:creationId xmlns:a16="http://schemas.microsoft.com/office/drawing/2014/main" id="{FA6A4B49-27C8-46B6-8B11-AD7E8F615E2C}"/>
+                <a16:creationId xmlns:a16="http://schemas.microsoft.com/office/drawing/2014/main" xmlns="" id="{FA6A4B49-27C8-46B6-8B11-AD7E8F615E2C}"/>
               </a:ext>
             </a:extLst>
           </p:cNvPr>
@@ -6839,7 +6884,7 @@
           <p:cNvPr id="4" name="Slide Number Placeholder 3">
             <a:extLst>
               <a:ext uri="{FF2B5EF4-FFF2-40B4-BE49-F238E27FC236}">
-                <a16:creationId xmlns:a16="http://schemas.microsoft.com/office/drawing/2014/main" id="{62B4CE3A-8C88-45AA-A849-57E5A7AC22C1}"/>
+                <a16:creationId xmlns:a16="http://schemas.microsoft.com/office/drawing/2014/main" xmlns="" id="{62B4CE3A-8C88-45AA-A849-57E5A7AC22C1}"/>
               </a:ext>
             </a:extLst>
           </p:cNvPr>
@@ -6878,10 +6923,10 @@
           <p:cNvPr id="11" name="Rectangle 10">
             <a:extLst>
               <a:ext uri="{FF2B5EF4-FFF2-40B4-BE49-F238E27FC236}">
-                <a16:creationId xmlns:a16="http://schemas.microsoft.com/office/drawing/2014/main" id="{5F253864-26FA-4AB1-9F0A-4F57D870EE85}"/>
+                <a16:creationId xmlns:a16="http://schemas.microsoft.com/office/drawing/2014/main" xmlns="" id="{5F253864-26FA-4AB1-9F0A-4F57D870EE85}"/>
               </a:ext>
               <a:ext uri="{C183D7F6-B498-43B3-948B-1728B52AA6E4}">
-                <adec:decorative xmlns:adec="http://schemas.microsoft.com/office/drawing/2017/decorative" xmlns="" val="1"/>
+                <adec:decorative xmlns="" xmlns:adec="http://schemas.microsoft.com/office/drawing/2017/decorative" val="1"/>
               </a:ext>
             </a:extLst>
           </p:cNvPr>
@@ -6943,7 +6988,7 @@
           <a:blip r:embed="rId2">
             <a:extLst>
               <a:ext uri="{28A0092B-C50C-407E-A947-70E740481C1C}">
-                <a14:useLocalDpi xmlns:a14="http://schemas.microsoft.com/office/drawing/2010/main" val="0"/>
+                <a14:useLocalDpi xmlns:a14="http://schemas.microsoft.com/office/drawing/2010/main" xmlns="" val="0"/>
               </a:ext>
             </a:extLst>
           </a:blip>
@@ -6964,7 +7009,7 @@
     </p:spTree>
     <p:extLst>
       <p:ext uri="{BB962C8B-B14F-4D97-AF65-F5344CB8AC3E}">
-        <p14:creationId xmlns:p14="http://schemas.microsoft.com/office/powerpoint/2010/main" val="4068483233"/>
+        <p14:creationId xmlns:p14="http://schemas.microsoft.com/office/powerpoint/2010/main" xmlns="" val="4068483233"/>
       </p:ext>
     </p:extLst>
   </p:cSld>
@@ -7003,7 +7048,7 @@
           <p:cNvPr id="2" name="Title 1">
             <a:extLst>
               <a:ext uri="{FF2B5EF4-FFF2-40B4-BE49-F238E27FC236}">
-                <a16:creationId xmlns:a16="http://schemas.microsoft.com/office/drawing/2014/main" id="{E199600F-A17E-4354-A7AB-0CC2A43A9354}"/>
+                <a16:creationId xmlns:a16="http://schemas.microsoft.com/office/drawing/2014/main" xmlns="" id="{E199600F-A17E-4354-A7AB-0CC2A43A9354}"/>
               </a:ext>
             </a:extLst>
           </p:cNvPr>
@@ -7024,9 +7069,14 @@
           <a:bodyPr/>
           <a:lstStyle/>
           <a:p>
+            <a:pPr algn="ctr"/>
             <a:r>
               <a:rPr lang="en-US" dirty="0" smtClean="0"/>
-              <a:t>                          Floating Data Types</a:t>
+              <a:t>Floating </a:t>
+            </a:r>
+            <a:r>
+              <a:rPr lang="en-US" dirty="0" smtClean="0"/>
+              <a:t>Data Types</a:t>
             </a:r>
             <a:endParaRPr lang="en-US" dirty="0"/>
           </a:p>
@@ -7037,7 +7087,7 @@
           <p:cNvPr id="3" name="Content Placeholder 2">
             <a:extLst>
               <a:ext uri="{FF2B5EF4-FFF2-40B4-BE49-F238E27FC236}">
-                <a16:creationId xmlns:a16="http://schemas.microsoft.com/office/drawing/2014/main" id="{FA6A4B49-27C8-46B6-8B11-AD7E8F615E2C}"/>
+                <a16:creationId xmlns:a16="http://schemas.microsoft.com/office/drawing/2014/main" xmlns="" id="{FA6A4B49-27C8-46B6-8B11-AD7E8F615E2C}"/>
               </a:ext>
             </a:extLst>
           </p:cNvPr>
@@ -7109,7 +7159,7 @@
           <p:cNvPr id="4" name="Slide Number Placeholder 3">
             <a:extLst>
               <a:ext uri="{FF2B5EF4-FFF2-40B4-BE49-F238E27FC236}">
-                <a16:creationId xmlns:a16="http://schemas.microsoft.com/office/drawing/2014/main" id="{62B4CE3A-8C88-45AA-A849-57E5A7AC22C1}"/>
+                <a16:creationId xmlns:a16="http://schemas.microsoft.com/office/drawing/2014/main" xmlns="" id="{62B4CE3A-8C88-45AA-A849-57E5A7AC22C1}"/>
               </a:ext>
             </a:extLst>
           </p:cNvPr>
@@ -7148,10 +7198,10 @@
           <p:cNvPr id="11" name="Rectangle 10">
             <a:extLst>
               <a:ext uri="{FF2B5EF4-FFF2-40B4-BE49-F238E27FC236}">
-                <a16:creationId xmlns:a16="http://schemas.microsoft.com/office/drawing/2014/main" id="{5F253864-26FA-4AB1-9F0A-4F57D870EE85}"/>
+                <a16:creationId xmlns:a16="http://schemas.microsoft.com/office/drawing/2014/main" xmlns="" id="{5F253864-26FA-4AB1-9F0A-4F57D870EE85}"/>
               </a:ext>
               <a:ext uri="{C183D7F6-B498-43B3-948B-1728B52AA6E4}">
-                <adec:decorative xmlns:adec="http://schemas.microsoft.com/office/drawing/2017/decorative" xmlns="" val="1"/>
+                <adec:decorative xmlns="" xmlns:adec="http://schemas.microsoft.com/office/drawing/2017/decorative" val="1"/>
               </a:ext>
             </a:extLst>
           </p:cNvPr>
@@ -7213,7 +7263,7 @@
           <a:blip r:embed="rId2">
             <a:extLst>
               <a:ext uri="{28A0092B-C50C-407E-A947-70E740481C1C}">
-                <a14:useLocalDpi xmlns:a14="http://schemas.microsoft.com/office/drawing/2010/main" val="0"/>
+                <a14:useLocalDpi xmlns:a14="http://schemas.microsoft.com/office/drawing/2010/main" xmlns="" val="0"/>
               </a:ext>
             </a:extLst>
           </a:blip>
@@ -7234,7 +7284,7 @@
     </p:spTree>
     <p:extLst>
       <p:ext uri="{BB962C8B-B14F-4D97-AF65-F5344CB8AC3E}">
-        <p14:creationId xmlns:p14="http://schemas.microsoft.com/office/powerpoint/2010/main" val="134744934"/>
+        <p14:creationId xmlns:p14="http://schemas.microsoft.com/office/powerpoint/2010/main" xmlns="" val="134744934"/>
       </p:ext>
     </p:extLst>
   </p:cSld>
@@ -7273,7 +7323,7 @@
           <p:cNvPr id="2" name="Title 1">
             <a:extLst>
               <a:ext uri="{FF2B5EF4-FFF2-40B4-BE49-F238E27FC236}">
-                <a16:creationId xmlns:a16="http://schemas.microsoft.com/office/drawing/2014/main" id="{E199600F-A17E-4354-A7AB-0CC2A43A9354}"/>
+                <a16:creationId xmlns:a16="http://schemas.microsoft.com/office/drawing/2014/main" xmlns="" id="{E199600F-A17E-4354-A7AB-0CC2A43A9354}"/>
               </a:ext>
             </a:extLst>
           </p:cNvPr>
@@ -7294,9 +7344,14 @@
           <a:bodyPr/>
           <a:lstStyle/>
           <a:p>
+            <a:pPr algn="ctr"/>
             <a:r>
               <a:rPr lang="en-US" dirty="0" smtClean="0"/>
-              <a:t>                          Boolean Data type</a:t>
+              <a:t>Boolean </a:t>
+            </a:r>
+            <a:r>
+              <a:rPr lang="en-US" dirty="0" smtClean="0"/>
+              <a:t>Data type</a:t>
             </a:r>
             <a:endParaRPr lang="en-US" dirty="0"/>
           </a:p>
@@ -7307,7 +7362,7 @@
           <p:cNvPr id="3" name="Content Placeholder 2">
             <a:extLst>
               <a:ext uri="{FF2B5EF4-FFF2-40B4-BE49-F238E27FC236}">
-                <a16:creationId xmlns:a16="http://schemas.microsoft.com/office/drawing/2014/main" id="{FA6A4B49-27C8-46B6-8B11-AD7E8F615E2C}"/>
+                <a16:creationId xmlns:a16="http://schemas.microsoft.com/office/drawing/2014/main" xmlns="" id="{FA6A4B49-27C8-46B6-8B11-AD7E8F615E2C}"/>
               </a:ext>
             </a:extLst>
           </p:cNvPr>
@@ -7384,7 +7439,7 @@
           <p:cNvPr id="4" name="Slide Number Placeholder 3">
             <a:extLst>
               <a:ext uri="{FF2B5EF4-FFF2-40B4-BE49-F238E27FC236}">
-                <a16:creationId xmlns:a16="http://schemas.microsoft.com/office/drawing/2014/main" id="{62B4CE3A-8C88-45AA-A849-57E5A7AC22C1}"/>
+                <a16:creationId xmlns:a16="http://schemas.microsoft.com/office/drawing/2014/main" xmlns="" id="{62B4CE3A-8C88-45AA-A849-57E5A7AC22C1}"/>
               </a:ext>
             </a:extLst>
           </p:cNvPr>
@@ -7423,10 +7478,10 @@
           <p:cNvPr id="11" name="Rectangle 10">
             <a:extLst>
               <a:ext uri="{FF2B5EF4-FFF2-40B4-BE49-F238E27FC236}">
-                <a16:creationId xmlns:a16="http://schemas.microsoft.com/office/drawing/2014/main" id="{5F253864-26FA-4AB1-9F0A-4F57D870EE85}"/>
+                <a16:creationId xmlns:a16="http://schemas.microsoft.com/office/drawing/2014/main" xmlns="" id="{5F253864-26FA-4AB1-9F0A-4F57D870EE85}"/>
               </a:ext>
               <a:ext uri="{C183D7F6-B498-43B3-948B-1728B52AA6E4}">
-                <adec:decorative xmlns:adec="http://schemas.microsoft.com/office/drawing/2017/decorative" xmlns="" val="1"/>
+                <adec:decorative xmlns="" xmlns:adec="http://schemas.microsoft.com/office/drawing/2017/decorative" val="1"/>
               </a:ext>
             </a:extLst>
           </p:cNvPr>
@@ -7488,7 +7543,7 @@
           <a:blip r:embed="rId2">
             <a:extLst>
               <a:ext uri="{28A0092B-C50C-407E-A947-70E740481C1C}">
-                <a14:useLocalDpi xmlns:a14="http://schemas.microsoft.com/office/drawing/2010/main" val="0"/>
+                <a14:useLocalDpi xmlns:a14="http://schemas.microsoft.com/office/drawing/2010/main" xmlns="" val="0"/>
               </a:ext>
             </a:extLst>
           </a:blip>
@@ -7509,7 +7564,7 @@
     </p:spTree>
     <p:extLst>
       <p:ext uri="{BB962C8B-B14F-4D97-AF65-F5344CB8AC3E}">
-        <p14:creationId xmlns:p14="http://schemas.microsoft.com/office/powerpoint/2010/main" val="2966179024"/>
+        <p14:creationId xmlns:p14="http://schemas.microsoft.com/office/powerpoint/2010/main" xmlns="" val="2966179024"/>
       </p:ext>
     </p:extLst>
   </p:cSld>
@@ -7548,7 +7603,7 @@
           <p:cNvPr id="2" name="Title 1">
             <a:extLst>
               <a:ext uri="{FF2B5EF4-FFF2-40B4-BE49-F238E27FC236}">
-                <a16:creationId xmlns:a16="http://schemas.microsoft.com/office/drawing/2014/main" id="{E199600F-A17E-4354-A7AB-0CC2A43A9354}"/>
+                <a16:creationId xmlns:a16="http://schemas.microsoft.com/office/drawing/2014/main" xmlns="" id="{E199600F-A17E-4354-A7AB-0CC2A43A9354}"/>
               </a:ext>
             </a:extLst>
           </p:cNvPr>
@@ -7569,9 +7624,14 @@
           <a:bodyPr/>
           <a:lstStyle/>
           <a:p>
+            <a:pPr algn="ctr"/>
             <a:r>
               <a:rPr lang="en-US" dirty="0" smtClean="0"/>
-              <a:t>                      Class : Complex Data types</a:t>
+              <a:t>Class </a:t>
+            </a:r>
+            <a:r>
+              <a:rPr lang="en-US" dirty="0" smtClean="0"/>
+              <a:t>: Complex Data types</a:t>
             </a:r>
             <a:endParaRPr lang="en-US" dirty="0"/>
           </a:p>
@@ -7582,7 +7642,7 @@
           <p:cNvPr id="3" name="Content Placeholder 2">
             <a:extLst>
               <a:ext uri="{FF2B5EF4-FFF2-40B4-BE49-F238E27FC236}">
-                <a16:creationId xmlns:a16="http://schemas.microsoft.com/office/drawing/2014/main" id="{FA6A4B49-27C8-46B6-8B11-AD7E8F615E2C}"/>
+                <a16:creationId xmlns:a16="http://schemas.microsoft.com/office/drawing/2014/main" xmlns="" id="{FA6A4B49-27C8-46B6-8B11-AD7E8F615E2C}"/>
               </a:ext>
             </a:extLst>
           </p:cNvPr>
@@ -7593,7 +7653,12 @@
             <p:ph idx="1"/>
           </p:nvPr>
         </p:nvSpPr>
-        <p:spPr/>
+        <p:spPr>
+          <a:xfrm>
+            <a:off x="838200" y="1825625"/>
+            <a:ext cx="6032863" cy="4351338"/>
+          </a:xfrm>
+        </p:spPr>
         <p:txBody>
           <a:bodyPr>
             <a:normAutofit/>
@@ -7636,7 +7701,7 @@
           <p:cNvPr id="4" name="Slide Number Placeholder 3">
             <a:extLst>
               <a:ext uri="{FF2B5EF4-FFF2-40B4-BE49-F238E27FC236}">
-                <a16:creationId xmlns:a16="http://schemas.microsoft.com/office/drawing/2014/main" id="{62B4CE3A-8C88-45AA-A849-57E5A7AC22C1}"/>
+                <a16:creationId xmlns:a16="http://schemas.microsoft.com/office/drawing/2014/main" xmlns="" id="{62B4CE3A-8C88-45AA-A849-57E5A7AC22C1}"/>
               </a:ext>
             </a:extLst>
           </p:cNvPr>
@@ -7675,10 +7740,10 @@
           <p:cNvPr id="11" name="Rectangle 10">
             <a:extLst>
               <a:ext uri="{FF2B5EF4-FFF2-40B4-BE49-F238E27FC236}">
-                <a16:creationId xmlns:a16="http://schemas.microsoft.com/office/drawing/2014/main" id="{5F253864-26FA-4AB1-9F0A-4F57D870EE85}"/>
+                <a16:creationId xmlns:a16="http://schemas.microsoft.com/office/drawing/2014/main" xmlns="" id="{5F253864-26FA-4AB1-9F0A-4F57D870EE85}"/>
               </a:ext>
               <a:ext uri="{C183D7F6-B498-43B3-948B-1728B52AA6E4}">
-                <adec:decorative xmlns:adec="http://schemas.microsoft.com/office/drawing/2017/decorative" xmlns="" val="1"/>
+                <adec:decorative xmlns="" xmlns:adec="http://schemas.microsoft.com/office/drawing/2017/decorative" val="1"/>
               </a:ext>
             </a:extLst>
           </p:cNvPr>
@@ -7740,7 +7805,7 @@
           <a:blip r:embed="rId2">
             <a:extLst>
               <a:ext uri="{28A0092B-C50C-407E-A947-70E740481C1C}">
-                <a14:useLocalDpi xmlns:a14="http://schemas.microsoft.com/office/drawing/2010/main" val="0"/>
+                <a14:useLocalDpi xmlns:a14="http://schemas.microsoft.com/office/drawing/2010/main" xmlns="" val="0"/>
               </a:ext>
             </a:extLst>
           </a:blip>
@@ -7770,7 +7835,7 @@
           <a:blip r:embed="rId3">
             <a:extLst>
               <a:ext uri="{28A0092B-C50C-407E-A947-70E740481C1C}">
-                <a14:useLocalDpi xmlns:a14="http://schemas.microsoft.com/office/drawing/2010/main" val="0"/>
+                <a14:useLocalDpi xmlns:a14="http://schemas.microsoft.com/office/drawing/2010/main" xmlns="" val="0"/>
               </a:ext>
             </a:extLst>
           </a:blip>
@@ -7791,7 +7856,7 @@
     </p:spTree>
     <p:extLst>
       <p:ext uri="{BB962C8B-B14F-4D97-AF65-F5344CB8AC3E}">
-        <p14:creationId xmlns:p14="http://schemas.microsoft.com/office/powerpoint/2010/main" val="650196804"/>
+        <p14:creationId xmlns:p14="http://schemas.microsoft.com/office/powerpoint/2010/main" xmlns="" val="650196804"/>
       </p:ext>
     </p:extLst>
   </p:cSld>
@@ -8003,7 +8068,7 @@
   <a:extraClrSchemeLst/>
   <a:extLst>
     <a:ext uri="{05A4C25C-085E-4340-85A3-A5531E510DB2}">
-      <thm15:themeFamily xmlns:thm15="http://schemas.microsoft.com/office/thememl/2012/main" name="Classic-Corporate_Teach a Course_Win32_SB - v2" id="{AAA48AC2-5F99-4B13-8624-B64D50F70391}" vid="{7E93EDBA-CDC2-40D2-AD59-7619D791F782}"/>
+      <thm15:themeFamily xmlns:thm15="http://schemas.microsoft.com/office/thememl/2012/main" xmlns="" name="Classic-Corporate_Teach a Course_Win32_SB - v2" id="{AAA48AC2-5F99-4B13-8624-B64D50F70391}" vid="{7E93EDBA-CDC2-40D2-AD59-7619D791F782}"/>
     </a:ext>
   </a:extLst>
 </a:theme>
@@ -8052,7 +8117,7 @@
     </a:clrScheme>
     <a:fontScheme name="Office">
       <a:majorFont>
-        <a:latin typeface="Calibri Light" panose="020F0302020204030204"/>
+        <a:latin typeface="Calibri Light"/>
         <a:ea typeface=""/>
         <a:cs typeface=""/>
         <a:font script="Jpan" typeface="游ゴシック Light"/>
@@ -8104,7 +8169,7 @@
         <a:font script="Tfng" typeface="Ebrima"/>
       </a:majorFont>
       <a:minorFont>
-        <a:latin typeface="Calibri" panose="020F0502020204030204"/>
+        <a:latin typeface="Calibri"/>
         <a:ea typeface=""/>
         <a:cs typeface=""/>
         <a:font script="Jpan" typeface="游ゴシック"/>
@@ -8298,7 +8363,7 @@
   <a:extraClrSchemeLst/>
   <a:extLst>
     <a:ext uri="{05A4C25C-085E-4340-85A3-A5531E510DB2}">
-      <thm15:themeFamily xmlns:thm15="http://schemas.microsoft.com/office/thememl/2012/main" name="Office Theme" id="{62F939B6-93AF-4DB8-9C6B-D6C7DFDC589F}" vid="{4A3C46E8-61CC-4603-A589-7422A47A8E4A}"/>
+      <thm15:themeFamily xmlns:thm15="http://schemas.microsoft.com/office/thememl/2012/main" xmlns="" name="Office Theme" id="{62F939B6-93AF-4DB8-9C6B-D6C7DFDC589F}" vid="{4A3C46E8-61CC-4603-A589-7422A47A8E4A}"/>
     </a:ext>
   </a:extLst>
 </a:theme>
@@ -8347,7 +8412,7 @@
     </a:clrScheme>
     <a:fontScheme name="Office">
       <a:majorFont>
-        <a:latin typeface="Calibri Light" panose="020F0302020204030204"/>
+        <a:latin typeface="Calibri Light"/>
         <a:ea typeface=""/>
         <a:cs typeface=""/>
         <a:font script="Jpan" typeface="游ゴシック Light"/>
@@ -8399,7 +8464,7 @@
         <a:font script="Tfng" typeface="Ebrima"/>
       </a:majorFont>
       <a:minorFont>
-        <a:latin typeface="Calibri" panose="020F0502020204030204"/>
+        <a:latin typeface="Calibri"/>
         <a:ea typeface=""/>
         <a:cs typeface=""/>
         <a:font script="Jpan" typeface="游ゴシック"/>
@@ -8593,7 +8658,7 @@
   <a:extraClrSchemeLst/>
   <a:extLst>
     <a:ext uri="{05A4C25C-085E-4340-85A3-A5531E510DB2}">
-      <thm15:themeFamily xmlns:thm15="http://schemas.microsoft.com/office/thememl/2012/main" name="Office Theme" id="{62F939B6-93AF-4DB8-9C6B-D6C7DFDC589F}" vid="{4A3C46E8-61CC-4603-A589-7422A47A8E4A}"/>
+      <thm15:themeFamily xmlns:thm15="http://schemas.microsoft.com/office/thememl/2012/main" xmlns="" name="Office Theme" id="{62F939B6-93AF-4DB8-9C6B-D6C7DFDC589F}" vid="{4A3C46E8-61CC-4603-A589-7422A47A8E4A}"/>
     </a:ext>
   </a:extLst>
 </a:theme>
@@ -8686,6 +8751,24 @@
 </file>
 
 <file path=customXml/item1.xml><?xml version="1.0" encoding="utf-8"?>
+<?mso-contentType ?>
+<FormTemplates xmlns="http://schemas.microsoft.com/sharepoint/v3/contenttype/forms">
+  <Display>DocumentLibraryForm</Display>
+  <Edit>DocumentLibraryForm</Edit>
+  <New>DocumentLibraryForm</New>
+</FormTemplates>
+</file>
+
+<file path=customXml/item2.xml><?xml version="1.0" encoding="utf-8"?>
+<p:properties xmlns:p="http://schemas.microsoft.com/office/2006/metadata/properties" xmlns:xsi="http://www.w3.org/2001/XMLSchema-instance" xmlns:pc="http://schemas.microsoft.com/office/infopath/2007/PartnerControls">
+  <documentManagement>
+    <Status xmlns="71af3243-3dd4-4a8d-8c0d-dd76da1f02a5">Not started</Status>
+    <MediaServiceKeyPoints xmlns="71af3243-3dd4-4a8d-8c0d-dd76da1f02a5" xsi:nil="true"/>
+  </documentManagement>
+</p:properties>
+</file>
+
+<file path=customXml/item3.xml><?xml version="1.0" encoding="utf-8"?>
 <ct:contentTypeSchema xmlns:ct="http://schemas.microsoft.com/office/2006/metadata/contentType" xmlns:ma="http://schemas.microsoft.com/office/2006/metadata/properties/metaAttributes" ct:_="" ma:_="" ma:contentTypeName="Document" ma:contentTypeID="0x01010079F111ED35F8CC479449609E8A0923A6" ma:contentTypeVersion="12" ma:contentTypeDescription="Create a new document." ma:contentTypeScope="" ma:versionID="fa6e671f1cd7e4d96ff9652be322dd5e">
   <xsd:schema xmlns:xsd="http://www.w3.org/2001/XMLSchema" xmlns:xs="http://www.w3.org/2001/XMLSchema" xmlns:p="http://schemas.microsoft.com/office/2006/metadata/properties" xmlns:ns2="71af3243-3dd4-4a8d-8c0d-dd76da1f02a5" xmlns:ns3="16c05727-aa75-4e4a-9b5f-8a80a1165891" targetNamespace="http://schemas.microsoft.com/office/2006/metadata/properties" ma:root="true" ma:fieldsID="4e2496f70b101db0b8013f30a071bbf7" ns2:_="" ns3:_="">
     <xsd:import namespace="71af3243-3dd4-4a8d-8c0d-dd76da1f02a5"/>
@@ -8906,25 +8989,25 @@
 </ct:contentTypeSchema>
 </file>
 
-<file path=customXml/item2.xml><?xml version="1.0" encoding="utf-8"?>
-<p:properties xmlns:p="http://schemas.microsoft.com/office/2006/metadata/properties" xmlns:xsi="http://www.w3.org/2001/XMLSchema-instance" xmlns:pc="http://schemas.microsoft.com/office/infopath/2007/PartnerControls">
-  <documentManagement>
-    <Status xmlns="71af3243-3dd4-4a8d-8c0d-dd76da1f02a5">Not started</Status>
-    <MediaServiceKeyPoints xmlns="71af3243-3dd4-4a8d-8c0d-dd76da1f02a5" xsi:nil="true"/>
-  </documentManagement>
-</p:properties>
+<file path=customXml/itemProps1.xml><?xml version="1.0" encoding="utf-8"?>
+<ds:datastoreItem xmlns:ds="http://schemas.openxmlformats.org/officeDocument/2006/customXml" ds:itemID="{EBB7C387-AFDC-4FE3-A658-984B7F35F155}">
+  <ds:schemaRefs>
+    <ds:schemaRef ds:uri="http://schemas.microsoft.com/sharepoint/v3/contenttype/forms"/>
+  </ds:schemaRefs>
+</ds:datastoreItem>
 </file>
 
-<file path=customXml/item3.xml><?xml version="1.0" encoding="utf-8"?>
-<?mso-contentType ?>
-<FormTemplates xmlns="http://schemas.microsoft.com/sharepoint/v3/contenttype/forms">
-  <Display>DocumentLibraryForm</Display>
-  <Edit>DocumentLibraryForm</Edit>
-  <New>DocumentLibraryForm</New>
-</FormTemplates>
+<file path=customXml/itemProps2.xml><?xml version="1.0" encoding="utf-8"?>
+<ds:datastoreItem xmlns:ds="http://schemas.openxmlformats.org/officeDocument/2006/customXml" ds:itemID="{F4E32C0B-4052-44CB-9341-8AD8B2CC4712}">
+  <ds:schemaRefs>
+    <ds:schemaRef ds:uri="http://schemas.microsoft.com/office/2006/metadata/properties"/>
+    <ds:schemaRef ds:uri="http://schemas.microsoft.com/office/infopath/2007/PartnerControls"/>
+    <ds:schemaRef ds:uri="71af3243-3dd4-4a8d-8c0d-dd76da1f02a5"/>
+  </ds:schemaRefs>
+</ds:datastoreItem>
 </file>
 
-<file path=customXml/itemProps1.xml><?xml version="1.0" encoding="utf-8"?>
+<file path=customXml/itemProps3.xml><?xml version="1.0" encoding="utf-8"?>
 <ds:datastoreItem xmlns:ds="http://schemas.openxmlformats.org/officeDocument/2006/customXml" ds:itemID="{D6766BD6-F648-49AA-B7EC-13E75CECB99A}">
   <ds:schemaRefs>
     <ds:schemaRef ds:uri="http://schemas.microsoft.com/office/2006/metadata/contentType"/>
@@ -8941,22 +9024,4 @@
     <ds:schemaRef ds:uri="http://schemas.microsoft.com/internal/obd"/>
   </ds:schemaRefs>
 </ds:datastoreItem>
-</file>
-
-<file path=customXml/itemProps2.xml><?xml version="1.0" encoding="utf-8"?>
-<ds:datastoreItem xmlns:ds="http://schemas.openxmlformats.org/officeDocument/2006/customXml" ds:itemID="{F4E32C0B-4052-44CB-9341-8AD8B2CC4712}">
-  <ds:schemaRefs>
-    <ds:schemaRef ds:uri="http://schemas.microsoft.com/office/2006/metadata/properties"/>
-    <ds:schemaRef ds:uri="http://schemas.microsoft.com/office/infopath/2007/PartnerControls"/>
-    <ds:schemaRef ds:uri="71af3243-3dd4-4a8d-8c0d-dd76da1f02a5"/>
-  </ds:schemaRefs>
-</ds:datastoreItem>
-</file>
-
-<file path=customXml/itemProps3.xml><?xml version="1.0" encoding="utf-8"?>
-<ds:datastoreItem xmlns:ds="http://schemas.openxmlformats.org/officeDocument/2006/customXml" ds:itemID="{EBB7C387-AFDC-4FE3-A658-984B7F35F155}">
-  <ds:schemaRefs>
-    <ds:schemaRef ds:uri="http://schemas.microsoft.com/sharepoint/v3/contenttype/forms"/>
-  </ds:schemaRefs>
-</ds:datastoreItem>
 </file>
</xml_diff>